<commit_message>
Updated Video System Architecture
</commit_message>
<xml_diff>
--- a/Video/ISS IPA PROJECT PRESENTATION - SYSTEM ARCHITECTURE.pptx
+++ b/Video/ISS IPA PROJECT PRESENTATION - SYSTEM ARCHITECTURE.pptx
@@ -8,6 +8,10 @@
     <p:sldId id="256" r:id="rId2"/>
     <p:sldId id="260" r:id="rId3"/>
     <p:sldId id="257" r:id="rId4"/>
+    <p:sldId id="261" r:id="rId5"/>
+    <p:sldId id="262" r:id="rId6"/>
+    <p:sldId id="263" r:id="rId7"/>
+    <p:sldId id="264" r:id="rId8"/>
   </p:sldIdLst>
   <p:sldSz cx="12192000" cy="6858000"/>
   <p:notesSz cx="6858000" cy="9144000"/>
@@ -4265,110 +4269,53 @@
           </a:fontRef>
         </p:style>
       </p:cxnSp>
-      <p:grpSp>
-        <p:nvGrpSpPr>
-          <p:cNvPr id="21" name="Group 20">
-            <a:extLst>
-              <a:ext uri="{FF2B5EF4-FFF2-40B4-BE49-F238E27FC236}">
-                <a16:creationId xmlns:a16="http://schemas.microsoft.com/office/drawing/2014/main" id="{B618737A-D18C-4250-9BD5-D7F600EC73FA}"/>
-              </a:ext>
-            </a:extLst>
-          </p:cNvPr>
-          <p:cNvGrpSpPr/>
+      <p:pic>
+        <p:nvPicPr>
+          <p:cNvPr id="22" name="Picture 2" descr="Google Assistant - Wikipedia">
+            <a:extLst>
+              <a:ext uri="{FF2B5EF4-FFF2-40B4-BE49-F238E27FC236}">
+                <a16:creationId xmlns:a16="http://schemas.microsoft.com/office/drawing/2014/main" id="{EF700927-5EDC-4D6B-881A-3DAB0989C576}"/>
+              </a:ext>
+            </a:extLst>
+          </p:cNvPr>
+          <p:cNvPicPr>
+            <a:picLocks noChangeAspect="1" noChangeArrowheads="1"/>
+          </p:cNvPicPr>
           <p:nvPr/>
-        </p:nvGrpSpPr>
-        <p:grpSpPr>
+        </p:nvPicPr>
+        <p:blipFill>
+          <a:blip r:embed="rId2">
+            <a:extLst>
+              <a:ext uri="{28A0092B-C50C-407E-A947-70E740481C1C}">
+                <a14:useLocalDpi xmlns:a14="http://schemas.microsoft.com/office/drawing/2010/main" val="0"/>
+              </a:ext>
+            </a:extLst>
+          </a:blip>
+          <a:srcRect/>
+          <a:stretch>
+            <a:fillRect/>
+          </a:stretch>
+        </p:blipFill>
+        <p:spPr bwMode="auto">
           <a:xfrm>
-            <a:off x="10570730" y="121836"/>
-            <a:ext cx="1481310" cy="1292775"/>
-            <a:chOff x="116869" y="3841660"/>
-            <a:chExt cx="2610363" cy="2275936"/>
+            <a:off x="10760508" y="121836"/>
+            <a:ext cx="1291532" cy="1292775"/>
           </a:xfrm>
-        </p:grpSpPr>
-        <p:pic>
-          <p:nvPicPr>
-            <p:cNvPr id="22" name="Picture 2" descr="Google Assistant - Wikipedia">
-              <a:extLst>
-                <a:ext uri="{FF2B5EF4-FFF2-40B4-BE49-F238E27FC236}">
-                  <a16:creationId xmlns:a16="http://schemas.microsoft.com/office/drawing/2014/main" id="{EF700927-5EDC-4D6B-881A-3DAB0989C576}"/>
-                </a:ext>
-              </a:extLst>
-            </p:cNvPr>
-            <p:cNvPicPr>
-              <a:picLocks noChangeAspect="1" noChangeArrowheads="1"/>
-            </p:cNvPicPr>
-            <p:nvPr/>
-          </p:nvPicPr>
-          <p:blipFill>
-            <a:blip r:embed="rId2">
-              <a:extLst>
-                <a:ext uri="{28A0092B-C50C-407E-A947-70E740481C1C}">
-                  <a14:useLocalDpi xmlns:a14="http://schemas.microsoft.com/office/drawing/2010/main" val="0"/>
-                </a:ext>
-              </a:extLst>
-            </a:blip>
-            <a:srcRect/>
-            <a:stretch>
-              <a:fillRect/>
-            </a:stretch>
-          </p:blipFill>
-          <p:spPr bwMode="auto">
-            <a:xfrm>
-              <a:off x="451296" y="3841660"/>
-              <a:ext cx="2275936" cy="2275936"/>
-            </a:xfrm>
-            <a:prstGeom prst="rect">
-              <a:avLst/>
-            </a:prstGeom>
-            <a:noFill/>
-            <a:extLst>
-              <a:ext uri="{909E8E84-426E-40DD-AFC4-6F175D3DCCD1}">
-                <a14:hiddenFill xmlns:a14="http://schemas.microsoft.com/office/drawing/2010/main">
-                  <a:solidFill>
-                    <a:srgbClr val="FFFFFF"/>
-                  </a:solidFill>
-                </a14:hiddenFill>
-              </a:ext>
-            </a:extLst>
-          </p:spPr>
-        </p:pic>
-        <p:sp>
-          <p:nvSpPr>
-            <p:cNvPr id="23" name="TextBox 22">
-              <a:extLst>
-                <a:ext uri="{FF2B5EF4-FFF2-40B4-BE49-F238E27FC236}">
-                  <a16:creationId xmlns:a16="http://schemas.microsoft.com/office/drawing/2014/main" id="{CB63AD20-9099-42B2-A47E-76340BA182F7}"/>
-                </a:ext>
-              </a:extLst>
-            </p:cNvPr>
-            <p:cNvSpPr txBox="1"/>
-            <p:nvPr/>
-          </p:nvSpPr>
-          <p:spPr>
-            <a:xfrm>
-              <a:off x="116869" y="5600011"/>
-              <a:ext cx="1439796" cy="325303"/>
-            </a:xfrm>
-            <a:prstGeom prst="rect">
-              <a:avLst/>
-            </a:prstGeom>
-            <a:noFill/>
-          </p:spPr>
-          <p:txBody>
-            <a:bodyPr wrap="none" rtlCol="0">
-              <a:spAutoFit/>
-            </a:bodyPr>
-            <a:lstStyle/>
-            <a:p>
-              <a:pPr algn="ctr"/>
-              <a:r>
-                <a:rPr lang="en-SG" sz="1200" dirty="0"/>
-                <a:t>Google Assistant</a:t>
-              </a:r>
-            </a:p>
-          </p:txBody>
-        </p:sp>
-      </p:grpSp>
+          <a:prstGeom prst="rect">
+            <a:avLst/>
+          </a:prstGeom>
+          <a:noFill/>
+          <a:extLst>
+            <a:ext uri="{909E8E84-426E-40DD-AFC4-6F175D3DCCD1}">
+              <a14:hiddenFill xmlns:a14="http://schemas.microsoft.com/office/drawing/2010/main">
+                <a:solidFill>
+                  <a:srgbClr val="FFFFFF"/>
+                </a:solidFill>
+              </a14:hiddenFill>
+            </a:ext>
+          </a:extLst>
+        </p:spPr>
+      </p:pic>
       <p:grpSp>
         <p:nvGrpSpPr>
           <p:cNvPr id="5" name="Group 4">
@@ -6310,6 +6257,985 @@
 </p:sld>
 </file>
 
+<file path=ppt/slides/slide4.xml><?xml version="1.0" encoding="utf-8"?>
+<p:sld xmlns:a="http://schemas.openxmlformats.org/drawingml/2006/main" xmlns:r="http://schemas.openxmlformats.org/officeDocument/2006/relationships" xmlns:p="http://schemas.openxmlformats.org/presentationml/2006/main">
+  <p:cSld>
+    <p:spTree>
+      <p:nvGrpSpPr>
+        <p:cNvPr id="1" name=""/>
+        <p:cNvGrpSpPr/>
+        <p:nvPr/>
+      </p:nvGrpSpPr>
+      <p:grpSpPr>
+        <a:xfrm>
+          <a:off x="0" y="0"/>
+          <a:ext cx="0" cy="0"/>
+          <a:chOff x="0" y="0"/>
+          <a:chExt cx="0" cy="0"/>
+        </a:xfrm>
+      </p:grpSpPr>
+      <p:sp>
+        <p:nvSpPr>
+          <p:cNvPr id="24" name="TextBox 23">
+            <a:extLst>
+              <a:ext uri="{FF2B5EF4-FFF2-40B4-BE49-F238E27FC236}">
+                <a16:creationId xmlns:a16="http://schemas.microsoft.com/office/drawing/2014/main" id="{2728A82E-EB67-4925-A5D2-8F2ECE0F7D1B}"/>
+              </a:ext>
+            </a:extLst>
+          </p:cNvPr>
+          <p:cNvSpPr txBox="1"/>
+          <p:nvPr/>
+        </p:nvSpPr>
+        <p:spPr>
+          <a:xfrm>
+            <a:off x="597160" y="251927"/>
+            <a:ext cx="3407600" cy="369332"/>
+          </a:xfrm>
+          <a:prstGeom prst="rect">
+            <a:avLst/>
+          </a:prstGeom>
+          <a:noFill/>
+        </p:spPr>
+        <p:txBody>
+          <a:bodyPr wrap="none" rtlCol="0">
+            <a:spAutoFit/>
+          </a:bodyPr>
+          <a:lstStyle/>
+          <a:p>
+            <a:r>
+              <a:rPr lang="en-SG" b="1" u="sng" dirty="0"/>
+              <a:t>Technical Explanation of </a:t>
+            </a:r>
+            <a:r>
+              <a:rPr lang="en-SG" b="1" u="sng" dirty="0" err="1"/>
+              <a:t>Usecases</a:t>
+            </a:r>
+            <a:endParaRPr lang="en-SG" b="1" u="sng" dirty="0"/>
+          </a:p>
+        </p:txBody>
+      </p:sp>
+      <p:cxnSp>
+        <p:nvCxnSpPr>
+          <p:cNvPr id="25" name="Straight Connector 24">
+            <a:extLst>
+              <a:ext uri="{FF2B5EF4-FFF2-40B4-BE49-F238E27FC236}">
+                <a16:creationId xmlns:a16="http://schemas.microsoft.com/office/drawing/2014/main" id="{87FFB9B6-A7DC-42FA-A903-B18CF342DDD5}"/>
+              </a:ext>
+            </a:extLst>
+          </p:cNvPr>
+          <p:cNvCxnSpPr/>
+          <p:nvPr/>
+        </p:nvCxnSpPr>
+        <p:spPr>
+          <a:xfrm>
+            <a:off x="4095126" y="695885"/>
+            <a:ext cx="58723" cy="5850173"/>
+          </a:xfrm>
+          <a:prstGeom prst="line">
+            <a:avLst/>
+          </a:prstGeom>
+          <a:ln>
+            <a:solidFill>
+              <a:schemeClr val="bg1">
+                <a:lumMod val="50000"/>
+              </a:schemeClr>
+            </a:solidFill>
+            <a:prstDash val="lgDashDot"/>
+          </a:ln>
+        </p:spPr>
+        <p:style>
+          <a:lnRef idx="1">
+            <a:schemeClr val="accent1"/>
+          </a:lnRef>
+          <a:fillRef idx="0">
+            <a:schemeClr val="accent1"/>
+          </a:fillRef>
+          <a:effectRef idx="0">
+            <a:schemeClr val="accent1"/>
+          </a:effectRef>
+          <a:fontRef idx="minor">
+            <a:schemeClr val="tx1"/>
+          </a:fontRef>
+        </p:style>
+      </p:cxnSp>
+      <p:cxnSp>
+        <p:nvCxnSpPr>
+          <p:cNvPr id="26" name="Straight Connector 25">
+            <a:extLst>
+              <a:ext uri="{FF2B5EF4-FFF2-40B4-BE49-F238E27FC236}">
+                <a16:creationId xmlns:a16="http://schemas.microsoft.com/office/drawing/2014/main" id="{E237427C-908D-424B-AC7B-44A935386064}"/>
+              </a:ext>
+            </a:extLst>
+          </p:cNvPr>
+          <p:cNvCxnSpPr/>
+          <p:nvPr/>
+        </p:nvCxnSpPr>
+        <p:spPr>
+          <a:xfrm>
+            <a:off x="8037044" y="861256"/>
+            <a:ext cx="58723" cy="5850173"/>
+          </a:xfrm>
+          <a:prstGeom prst="line">
+            <a:avLst/>
+          </a:prstGeom>
+          <a:ln>
+            <a:solidFill>
+              <a:schemeClr val="bg1">
+                <a:lumMod val="50000"/>
+              </a:schemeClr>
+            </a:solidFill>
+            <a:prstDash val="lgDashDot"/>
+          </a:ln>
+        </p:spPr>
+        <p:style>
+          <a:lnRef idx="1">
+            <a:schemeClr val="accent1"/>
+          </a:lnRef>
+          <a:fillRef idx="0">
+            <a:schemeClr val="accent1"/>
+          </a:fillRef>
+          <a:effectRef idx="0">
+            <a:schemeClr val="accent1"/>
+          </a:effectRef>
+          <a:fontRef idx="minor">
+            <a:schemeClr val="tx1"/>
+          </a:fontRef>
+        </p:style>
+      </p:cxnSp>
+      <p:sp>
+        <p:nvSpPr>
+          <p:cNvPr id="27" name="Rectangle 26">
+            <a:extLst>
+              <a:ext uri="{FF2B5EF4-FFF2-40B4-BE49-F238E27FC236}">
+                <a16:creationId xmlns:a16="http://schemas.microsoft.com/office/drawing/2014/main" id="{3716DEF8-24E4-4B09-BE24-D013B44AB0A0}"/>
+              </a:ext>
+            </a:extLst>
+          </p:cNvPr>
+          <p:cNvSpPr/>
+          <p:nvPr/>
+        </p:nvSpPr>
+        <p:spPr>
+          <a:xfrm>
+            <a:off x="667030" y="3102478"/>
+            <a:ext cx="2922476" cy="1036986"/>
+          </a:xfrm>
+          <a:prstGeom prst="rect">
+            <a:avLst/>
+          </a:prstGeom>
+          <a:solidFill>
+            <a:srgbClr val="002060"/>
+          </a:solidFill>
+        </p:spPr>
+        <p:style>
+          <a:lnRef idx="2">
+            <a:schemeClr val="accent1">
+              <a:shade val="50000"/>
+            </a:schemeClr>
+          </a:lnRef>
+          <a:fillRef idx="1">
+            <a:schemeClr val="accent1"/>
+          </a:fillRef>
+          <a:effectRef idx="0">
+            <a:schemeClr val="accent1"/>
+          </a:effectRef>
+          <a:fontRef idx="minor">
+            <a:schemeClr val="lt1"/>
+          </a:fontRef>
+        </p:style>
+        <p:txBody>
+          <a:bodyPr rtlCol="0" anchor="ctr"/>
+          <a:lstStyle/>
+          <a:p>
+            <a:pPr algn="ctr"/>
+            <a:r>
+              <a:rPr kumimoji="0" lang="en-US" altLang="ja-JP" b="0" i="0" u="none" strike="noStrike" cap="none" normalizeH="0" baseline="0" dirty="0">
+                <a:ln>
+                  <a:noFill/>
+                </a:ln>
+                <a:solidFill>
+                  <a:schemeClr val="bg1"/>
+                </a:solidFill>
+                <a:effectLst/>
+                <a:latin typeface="Arial" panose="020B0604020202020204" pitchFamily="34" charset="0"/>
+                <a:ea typeface="DengXian" panose="02010600030101010101" pitchFamily="2" charset="-122"/>
+                <a:cs typeface="Arial" panose="020B0604020202020204" pitchFamily="34" charset="0"/>
+              </a:rPr>
+              <a:t>Conversational UI &amp; Email</a:t>
+            </a:r>
+            <a:endParaRPr kumimoji="0" lang="en-US" altLang="ja-JP" b="0" i="0" u="none" strike="noStrike" cap="none" normalizeH="0" baseline="0" dirty="0">
+              <a:ln>
+                <a:noFill/>
+              </a:ln>
+              <a:solidFill>
+                <a:schemeClr val="bg1"/>
+              </a:solidFill>
+              <a:effectLst/>
+              <a:latin typeface="Arial" panose="020B0604020202020204" pitchFamily="34" charset="0"/>
+            </a:endParaRPr>
+          </a:p>
+        </p:txBody>
+      </p:sp>
+      <p:sp>
+        <p:nvSpPr>
+          <p:cNvPr id="28" name="Rectangle 27">
+            <a:extLst>
+              <a:ext uri="{FF2B5EF4-FFF2-40B4-BE49-F238E27FC236}">
+                <a16:creationId xmlns:a16="http://schemas.microsoft.com/office/drawing/2014/main" id="{2B0A86B3-C356-420A-A818-8C3264B6A05C}"/>
+              </a:ext>
+            </a:extLst>
+          </p:cNvPr>
+          <p:cNvSpPr/>
+          <p:nvPr/>
+        </p:nvSpPr>
+        <p:spPr>
+          <a:xfrm>
+            <a:off x="4644116" y="3102478"/>
+            <a:ext cx="2903767" cy="1036986"/>
+          </a:xfrm>
+          <a:prstGeom prst="rect">
+            <a:avLst/>
+          </a:prstGeom>
+          <a:solidFill>
+            <a:srgbClr val="002060"/>
+          </a:solidFill>
+        </p:spPr>
+        <p:style>
+          <a:lnRef idx="2">
+            <a:schemeClr val="accent1">
+              <a:shade val="50000"/>
+            </a:schemeClr>
+          </a:lnRef>
+          <a:fillRef idx="1">
+            <a:schemeClr val="accent1"/>
+          </a:fillRef>
+          <a:effectRef idx="0">
+            <a:schemeClr val="accent1"/>
+          </a:effectRef>
+          <a:fontRef idx="minor">
+            <a:schemeClr val="lt1"/>
+          </a:fontRef>
+        </p:style>
+        <p:txBody>
+          <a:bodyPr rtlCol="0" anchor="ctr"/>
+          <a:lstStyle/>
+          <a:p>
+            <a:pPr algn="ctr"/>
+            <a:r>
+              <a:rPr kumimoji="0" lang="en-US" altLang="ja-JP" b="0" i="0" u="none" strike="noStrike" cap="none" normalizeH="0" baseline="0" dirty="0">
+                <a:ln>
+                  <a:noFill/>
+                </a:ln>
+                <a:solidFill>
+                  <a:schemeClr val="bg1"/>
+                </a:solidFill>
+                <a:effectLst/>
+                <a:latin typeface="Arial" panose="020B0604020202020204" pitchFamily="34" charset="0"/>
+              </a:rPr>
+              <a:t>NLB Availability Checker &amp; Amazon Recommendation Systems</a:t>
+            </a:r>
+          </a:p>
+        </p:txBody>
+      </p:sp>
+      <p:sp>
+        <p:nvSpPr>
+          <p:cNvPr id="29" name="Rectangle 28">
+            <a:extLst>
+              <a:ext uri="{FF2B5EF4-FFF2-40B4-BE49-F238E27FC236}">
+                <a16:creationId xmlns:a16="http://schemas.microsoft.com/office/drawing/2014/main" id="{D4581800-ED3C-45B7-A7FA-31C46DE532C0}"/>
+              </a:ext>
+            </a:extLst>
+          </p:cNvPr>
+          <p:cNvSpPr/>
+          <p:nvPr/>
+        </p:nvSpPr>
+        <p:spPr>
+          <a:xfrm>
+            <a:off x="8621203" y="3086874"/>
+            <a:ext cx="2903767" cy="1036986"/>
+          </a:xfrm>
+          <a:prstGeom prst="rect">
+            <a:avLst/>
+          </a:prstGeom>
+          <a:solidFill>
+            <a:srgbClr val="002060"/>
+          </a:solidFill>
+        </p:spPr>
+        <p:style>
+          <a:lnRef idx="2">
+            <a:schemeClr val="accent1">
+              <a:shade val="50000"/>
+            </a:schemeClr>
+          </a:lnRef>
+          <a:fillRef idx="1">
+            <a:schemeClr val="accent1"/>
+          </a:fillRef>
+          <a:effectRef idx="0">
+            <a:schemeClr val="accent1"/>
+          </a:effectRef>
+          <a:fontRef idx="minor">
+            <a:schemeClr val="lt1"/>
+          </a:fontRef>
+        </p:style>
+        <p:txBody>
+          <a:bodyPr rtlCol="0" anchor="ctr"/>
+          <a:lstStyle/>
+          <a:p>
+            <a:pPr algn="ctr"/>
+            <a:r>
+              <a:rPr kumimoji="0" lang="en-US" altLang="ja-JP" b="0" i="0" u="none" strike="noStrike" cap="none" normalizeH="0" baseline="0" dirty="0">
+                <a:ln>
+                  <a:noFill/>
+                </a:ln>
+                <a:solidFill>
+                  <a:schemeClr val="bg1"/>
+                </a:solidFill>
+                <a:effectLst/>
+                <a:latin typeface="Arial" panose="020B0604020202020204" pitchFamily="34" charset="0"/>
+              </a:rPr>
+              <a:t>Intelligent Title Matcher &amp; Abstract Summarizer</a:t>
+            </a:r>
+          </a:p>
+        </p:txBody>
+      </p:sp>
+      <p:sp>
+        <p:nvSpPr>
+          <p:cNvPr id="30" name="Rectangle 29">
+            <a:extLst>
+              <a:ext uri="{FF2B5EF4-FFF2-40B4-BE49-F238E27FC236}">
+                <a16:creationId xmlns:a16="http://schemas.microsoft.com/office/drawing/2014/main" id="{91BFAF68-63FA-4B7B-852A-4D9F6FACC22D}"/>
+              </a:ext>
+            </a:extLst>
+          </p:cNvPr>
+          <p:cNvSpPr/>
+          <p:nvPr/>
+        </p:nvSpPr>
+        <p:spPr>
+          <a:xfrm>
+            <a:off x="701092" y="4395020"/>
+            <a:ext cx="2915919" cy="1857983"/>
+          </a:xfrm>
+          <a:prstGeom prst="rect">
+            <a:avLst/>
+          </a:prstGeom>
+          <a:noFill/>
+          <a:ln w="25400">
+            <a:solidFill>
+              <a:srgbClr val="4285F4"/>
+            </a:solidFill>
+          </a:ln>
+        </p:spPr>
+        <p:style>
+          <a:lnRef idx="2">
+            <a:schemeClr val="accent1">
+              <a:shade val="50000"/>
+            </a:schemeClr>
+          </a:lnRef>
+          <a:fillRef idx="1">
+            <a:schemeClr val="accent1"/>
+          </a:fillRef>
+          <a:effectRef idx="0">
+            <a:schemeClr val="accent1"/>
+          </a:effectRef>
+          <a:fontRef idx="minor">
+            <a:schemeClr val="lt1"/>
+          </a:fontRef>
+        </p:style>
+        <p:txBody>
+          <a:bodyPr rtlCol="0" anchor="ctr"/>
+          <a:lstStyle/>
+          <a:p>
+            <a:pPr marL="285750" indent="-285750">
+              <a:buFont typeface="Arial" panose="020B0604020202020204" pitchFamily="34" charset="0"/>
+              <a:buChar char="•"/>
+            </a:pPr>
+            <a:r>
+              <a:rPr lang="en-SG" dirty="0">
+                <a:solidFill>
+                  <a:schemeClr val="tx1"/>
+                </a:solidFill>
+              </a:rPr>
+              <a:t>Powered by Google Assistant &amp; </a:t>
+            </a:r>
+            <a:r>
+              <a:rPr lang="en-SG" dirty="0" err="1">
+                <a:solidFill>
+                  <a:schemeClr val="tx1"/>
+                </a:solidFill>
+              </a:rPr>
+              <a:t>Dialogflow</a:t>
+            </a:r>
+            <a:endParaRPr lang="en-SG" dirty="0">
+              <a:solidFill>
+                <a:schemeClr val="tx1"/>
+              </a:solidFill>
+            </a:endParaRPr>
+          </a:p>
+          <a:p>
+            <a:pPr marL="285750" indent="-285750">
+              <a:buFont typeface="Arial" panose="020B0604020202020204" pitchFamily="34" charset="0"/>
+              <a:buChar char="•"/>
+            </a:pPr>
+            <a:r>
+              <a:rPr lang="en-SG" dirty="0">
+                <a:solidFill>
+                  <a:schemeClr val="tx1"/>
+                </a:solidFill>
+              </a:rPr>
+              <a:t>Qwerty</a:t>
+            </a:r>
+          </a:p>
+        </p:txBody>
+      </p:sp>
+      <p:sp>
+        <p:nvSpPr>
+          <p:cNvPr id="31" name="Rectangle 30">
+            <a:extLst>
+              <a:ext uri="{FF2B5EF4-FFF2-40B4-BE49-F238E27FC236}">
+                <a16:creationId xmlns:a16="http://schemas.microsoft.com/office/drawing/2014/main" id="{0872BC5F-BD41-4A94-B46D-E7EFFA0F55D7}"/>
+              </a:ext>
+            </a:extLst>
+          </p:cNvPr>
+          <p:cNvSpPr/>
+          <p:nvPr/>
+        </p:nvSpPr>
+        <p:spPr>
+          <a:xfrm>
+            <a:off x="4594015" y="4410624"/>
+            <a:ext cx="2915919" cy="1857983"/>
+          </a:xfrm>
+          <a:prstGeom prst="rect">
+            <a:avLst/>
+          </a:prstGeom>
+          <a:noFill/>
+          <a:ln w="25400">
+            <a:solidFill>
+              <a:srgbClr val="EA4335"/>
+            </a:solidFill>
+          </a:ln>
+        </p:spPr>
+        <p:style>
+          <a:lnRef idx="2">
+            <a:schemeClr val="accent1">
+              <a:shade val="50000"/>
+            </a:schemeClr>
+          </a:lnRef>
+          <a:fillRef idx="1">
+            <a:schemeClr val="accent1"/>
+          </a:fillRef>
+          <a:effectRef idx="0">
+            <a:schemeClr val="accent1"/>
+          </a:effectRef>
+          <a:fontRef idx="minor">
+            <a:schemeClr val="lt1"/>
+          </a:fontRef>
+        </p:style>
+        <p:txBody>
+          <a:bodyPr rtlCol="0" anchor="ctr"/>
+          <a:lstStyle/>
+          <a:p>
+            <a:pPr marL="285750" indent="-285750">
+              <a:buFont typeface="Arial" panose="020B0604020202020204" pitchFamily="34" charset="0"/>
+              <a:buChar char="•"/>
+            </a:pPr>
+            <a:r>
+              <a:rPr lang="en-SG" dirty="0">
+                <a:solidFill>
+                  <a:schemeClr val="tx1"/>
+                </a:solidFill>
+              </a:rPr>
+              <a:t>Powered by UI Tag</a:t>
+            </a:r>
+          </a:p>
+        </p:txBody>
+      </p:sp>
+      <p:sp>
+        <p:nvSpPr>
+          <p:cNvPr id="32" name="Rectangle 31">
+            <a:extLst>
+              <a:ext uri="{FF2B5EF4-FFF2-40B4-BE49-F238E27FC236}">
+                <a16:creationId xmlns:a16="http://schemas.microsoft.com/office/drawing/2014/main" id="{263A4C2F-3FCE-4954-87E5-2E588684D122}"/>
+              </a:ext>
+            </a:extLst>
+          </p:cNvPr>
+          <p:cNvSpPr/>
+          <p:nvPr/>
+        </p:nvSpPr>
+        <p:spPr>
+          <a:xfrm>
+            <a:off x="8615126" y="4410624"/>
+            <a:ext cx="2915919" cy="1857983"/>
+          </a:xfrm>
+          <a:prstGeom prst="rect">
+            <a:avLst/>
+          </a:prstGeom>
+          <a:noFill/>
+          <a:ln w="25400">
+            <a:solidFill>
+              <a:srgbClr val="FBBC05"/>
+            </a:solidFill>
+          </a:ln>
+        </p:spPr>
+        <p:style>
+          <a:lnRef idx="2">
+            <a:schemeClr val="accent1">
+              <a:shade val="50000"/>
+            </a:schemeClr>
+          </a:lnRef>
+          <a:fillRef idx="1">
+            <a:schemeClr val="accent1"/>
+          </a:fillRef>
+          <a:effectRef idx="0">
+            <a:schemeClr val="accent1"/>
+          </a:effectRef>
+          <a:fontRef idx="minor">
+            <a:schemeClr val="lt1"/>
+          </a:fontRef>
+        </p:style>
+        <p:txBody>
+          <a:bodyPr rtlCol="0" anchor="ctr"/>
+          <a:lstStyle/>
+          <a:p>
+            <a:pPr marL="285750" indent="-285750">
+              <a:buFont typeface="Arial" panose="020B0604020202020204" pitchFamily="34" charset="0"/>
+              <a:buChar char="•"/>
+            </a:pPr>
+            <a:r>
+              <a:rPr lang="en-SG" dirty="0">
+                <a:solidFill>
+                  <a:schemeClr val="tx1"/>
+                </a:solidFill>
+              </a:rPr>
+              <a:t>Powered by Bert </a:t>
+            </a:r>
+          </a:p>
+        </p:txBody>
+      </p:sp>
+      <p:pic>
+        <p:nvPicPr>
+          <p:cNvPr id="9" name="Picture 8">
+            <a:extLst>
+              <a:ext uri="{FF2B5EF4-FFF2-40B4-BE49-F238E27FC236}">
+                <a16:creationId xmlns:a16="http://schemas.microsoft.com/office/drawing/2014/main" id="{9E0F87DA-55CB-4B07-85D3-CD32A59E5178}"/>
+              </a:ext>
+            </a:extLst>
+          </p:cNvPr>
+          <p:cNvPicPr>
+            <a:picLocks noChangeAspect="1"/>
+          </p:cNvPicPr>
+          <p:nvPr/>
+        </p:nvPicPr>
+        <p:blipFill>
+          <a:blip r:embed="rId2"/>
+          <a:stretch>
+            <a:fillRect/>
+          </a:stretch>
+        </p:blipFill>
+        <p:spPr>
+          <a:xfrm>
+            <a:off x="640563" y="1548418"/>
+            <a:ext cx="2264130" cy="1333850"/>
+          </a:xfrm>
+          <a:prstGeom prst="rect">
+            <a:avLst/>
+          </a:prstGeom>
+        </p:spPr>
+      </p:pic>
+      <p:pic>
+        <p:nvPicPr>
+          <p:cNvPr id="36" name="Picture 2" descr="Google Assistant - Wikipedia">
+            <a:extLst>
+              <a:ext uri="{FF2B5EF4-FFF2-40B4-BE49-F238E27FC236}">
+                <a16:creationId xmlns:a16="http://schemas.microsoft.com/office/drawing/2014/main" id="{2BA0ECC8-1A81-48E9-807F-381E5C63762F}"/>
+              </a:ext>
+            </a:extLst>
+          </p:cNvPr>
+          <p:cNvPicPr>
+            <a:picLocks noChangeAspect="1" noChangeArrowheads="1"/>
+          </p:cNvPicPr>
+          <p:nvPr/>
+        </p:nvPicPr>
+        <p:blipFill>
+          <a:blip r:embed="rId3">
+            <a:extLst>
+              <a:ext uri="{28A0092B-C50C-407E-A947-70E740481C1C}">
+                <a14:useLocalDpi xmlns:a14="http://schemas.microsoft.com/office/drawing/2010/main" val="0"/>
+              </a:ext>
+            </a:extLst>
+          </a:blip>
+          <a:srcRect/>
+          <a:stretch>
+            <a:fillRect/>
+          </a:stretch>
+        </p:blipFill>
+        <p:spPr bwMode="auto">
+          <a:xfrm>
+            <a:off x="1901431" y="803072"/>
+            <a:ext cx="1703428" cy="1705067"/>
+          </a:xfrm>
+          <a:prstGeom prst="rect">
+            <a:avLst/>
+          </a:prstGeom>
+          <a:noFill/>
+          <a:extLst>
+            <a:ext uri="{909E8E84-426E-40DD-AFC4-6F175D3DCCD1}">
+              <a14:hiddenFill xmlns:a14="http://schemas.microsoft.com/office/drawing/2010/main">
+                <a:solidFill>
+                  <a:srgbClr val="FFFFFF"/>
+                </a:solidFill>
+              </a14:hiddenFill>
+            </a:ext>
+          </a:extLst>
+        </p:spPr>
+      </p:pic>
+      <p:pic>
+        <p:nvPicPr>
+          <p:cNvPr id="1026" name="Picture 2" descr="Amazon to expand to South East Asia through Singapore - KLGadgetGuy">
+            <a:extLst>
+              <a:ext uri="{FF2B5EF4-FFF2-40B4-BE49-F238E27FC236}">
+                <a16:creationId xmlns:a16="http://schemas.microsoft.com/office/drawing/2014/main" id="{10D99925-2D82-42A7-BC92-60BD91ABD7F2}"/>
+              </a:ext>
+            </a:extLst>
+          </p:cNvPr>
+          <p:cNvPicPr>
+            <a:picLocks noChangeAspect="1" noChangeArrowheads="1"/>
+          </p:cNvPicPr>
+          <p:nvPr/>
+        </p:nvPicPr>
+        <p:blipFill rotWithShape="1">
+          <a:blip r:embed="rId4">
+            <a:extLst>
+              <a:ext uri="{28A0092B-C50C-407E-A947-70E740481C1C}">
+                <a14:useLocalDpi xmlns:a14="http://schemas.microsoft.com/office/drawing/2010/main" val="0"/>
+              </a:ext>
+            </a:extLst>
+          </a:blip>
+          <a:srcRect l="7264" t="29085" r="7174" b="34689"/>
+          <a:stretch/>
+        </p:blipFill>
+        <p:spPr bwMode="auto">
+          <a:xfrm>
+            <a:off x="4659469" y="844478"/>
+            <a:ext cx="1770077" cy="749430"/>
+          </a:xfrm>
+          <a:prstGeom prst="rect">
+            <a:avLst/>
+          </a:prstGeom>
+          <a:noFill/>
+          <a:extLst>
+            <a:ext uri="{909E8E84-426E-40DD-AFC4-6F175D3DCCD1}">
+              <a14:hiddenFill xmlns:a14="http://schemas.microsoft.com/office/drawing/2010/main">
+                <a:solidFill>
+                  <a:srgbClr val="FFFFFF"/>
+                </a:solidFill>
+              </a14:hiddenFill>
+            </a:ext>
+          </a:extLst>
+        </p:spPr>
+      </p:pic>
+      <p:pic>
+        <p:nvPicPr>
+          <p:cNvPr id="1028" name="Picture 4" descr="Global Civica Office Locations Civica - induced.info">
+            <a:extLst>
+              <a:ext uri="{FF2B5EF4-FFF2-40B4-BE49-F238E27FC236}">
+                <a16:creationId xmlns:a16="http://schemas.microsoft.com/office/drawing/2014/main" id="{406ABC36-8590-4A24-AB54-21773F5013C8}"/>
+              </a:ext>
+            </a:extLst>
+          </p:cNvPr>
+          <p:cNvPicPr>
+            <a:picLocks noChangeAspect="1" noChangeArrowheads="1"/>
+          </p:cNvPicPr>
+          <p:nvPr/>
+        </p:nvPicPr>
+        <p:blipFill rotWithShape="1">
+          <a:blip r:embed="rId5">
+            <a:extLst>
+              <a:ext uri="{28A0092B-C50C-407E-A947-70E740481C1C}">
+                <a14:useLocalDpi xmlns:a14="http://schemas.microsoft.com/office/drawing/2010/main" val="0"/>
+              </a:ext>
+            </a:extLst>
+          </a:blip>
+          <a:srcRect l="12647" t="19936"/>
+          <a:stretch/>
+        </p:blipFill>
+        <p:spPr bwMode="auto">
+          <a:xfrm>
+            <a:off x="5890761" y="1333850"/>
+            <a:ext cx="1832710" cy="1425942"/>
+          </a:xfrm>
+          <a:prstGeom prst="rect">
+            <a:avLst/>
+          </a:prstGeom>
+          <a:noFill/>
+          <a:extLst>
+            <a:ext uri="{909E8E84-426E-40DD-AFC4-6F175D3DCCD1}">
+              <a14:hiddenFill xmlns:a14="http://schemas.microsoft.com/office/drawing/2010/main">
+                <a:solidFill>
+                  <a:srgbClr val="FFFFFF"/>
+                </a:solidFill>
+              </a14:hiddenFill>
+            </a:ext>
+          </a:extLst>
+        </p:spPr>
+      </p:pic>
+      <p:pic>
+        <p:nvPicPr>
+          <p:cNvPr id="1030" name="Picture 6" descr="Building a More Intelligent Enterprise">
+            <a:extLst>
+              <a:ext uri="{FF2B5EF4-FFF2-40B4-BE49-F238E27FC236}">
+                <a16:creationId xmlns:a16="http://schemas.microsoft.com/office/drawing/2014/main" id="{8B61D762-D553-41C8-BDFB-2008277CCCEA}"/>
+              </a:ext>
+            </a:extLst>
+          </p:cNvPr>
+          <p:cNvPicPr>
+            <a:picLocks noChangeAspect="1" noChangeArrowheads="1"/>
+          </p:cNvPicPr>
+          <p:nvPr/>
+        </p:nvPicPr>
+        <p:blipFill>
+          <a:blip r:embed="rId6">
+            <a:extLst>
+              <a:ext uri="{28A0092B-C50C-407E-A947-70E740481C1C}">
+                <a14:useLocalDpi xmlns:a14="http://schemas.microsoft.com/office/drawing/2010/main" val="0"/>
+              </a:ext>
+            </a:extLst>
+          </a:blip>
+          <a:srcRect/>
+          <a:stretch>
+            <a:fillRect/>
+          </a:stretch>
+        </p:blipFill>
+        <p:spPr bwMode="auto">
+          <a:xfrm>
+            <a:off x="9076850" y="767323"/>
+            <a:ext cx="1992469" cy="1992469"/>
+          </a:xfrm>
+          <a:prstGeom prst="rect">
+            <a:avLst/>
+          </a:prstGeom>
+          <a:noFill/>
+          <a:extLst>
+            <a:ext uri="{909E8E84-426E-40DD-AFC4-6F175D3DCCD1}">
+              <a14:hiddenFill xmlns:a14="http://schemas.microsoft.com/office/drawing/2010/main">
+                <a:solidFill>
+                  <a:srgbClr val="FFFFFF"/>
+                </a:solidFill>
+              </a14:hiddenFill>
+            </a:ext>
+          </a:extLst>
+        </p:spPr>
+      </p:pic>
+    </p:spTree>
+    <p:extLst>
+      <p:ext uri="{BB962C8B-B14F-4D97-AF65-F5344CB8AC3E}">
+        <p14:creationId xmlns:p14="http://schemas.microsoft.com/office/powerpoint/2010/main" val="2019296104"/>
+      </p:ext>
+    </p:extLst>
+  </p:cSld>
+  <p:clrMapOvr>
+    <a:masterClrMapping/>
+  </p:clrMapOvr>
+</p:sld>
+</file>
+
+<file path=ppt/slides/slide5.xml><?xml version="1.0" encoding="utf-8"?>
+<p:sld xmlns:a="http://schemas.openxmlformats.org/drawingml/2006/main" xmlns:r="http://schemas.openxmlformats.org/officeDocument/2006/relationships" xmlns:p="http://schemas.openxmlformats.org/presentationml/2006/main">
+  <p:cSld>
+    <p:spTree>
+      <p:nvGrpSpPr>
+        <p:cNvPr id="1" name=""/>
+        <p:cNvGrpSpPr/>
+        <p:nvPr/>
+      </p:nvGrpSpPr>
+      <p:grpSpPr>
+        <a:xfrm>
+          <a:off x="0" y="0"/>
+          <a:ext cx="0" cy="0"/>
+          <a:chOff x="0" y="0"/>
+          <a:chExt cx="0" cy="0"/>
+        </a:xfrm>
+      </p:grpSpPr>
+      <p:sp>
+        <p:nvSpPr>
+          <p:cNvPr id="24" name="TextBox 23">
+            <a:extLst>
+              <a:ext uri="{FF2B5EF4-FFF2-40B4-BE49-F238E27FC236}">
+                <a16:creationId xmlns:a16="http://schemas.microsoft.com/office/drawing/2014/main" id="{2728A82E-EB67-4925-A5D2-8F2ECE0F7D1B}"/>
+              </a:ext>
+            </a:extLst>
+          </p:cNvPr>
+          <p:cNvSpPr txBox="1"/>
+          <p:nvPr/>
+        </p:nvSpPr>
+        <p:spPr>
+          <a:xfrm>
+            <a:off x="597160" y="251927"/>
+            <a:ext cx="2551148" cy="369332"/>
+          </a:xfrm>
+          <a:prstGeom prst="rect">
+            <a:avLst/>
+          </a:prstGeom>
+          <a:noFill/>
+        </p:spPr>
+        <p:txBody>
+          <a:bodyPr wrap="none" rtlCol="0">
+            <a:spAutoFit/>
+          </a:bodyPr>
+          <a:lstStyle/>
+          <a:p>
+            <a:r>
+              <a:rPr lang="en-SG" b="1" u="sng" dirty="0" err="1"/>
+              <a:t>Converstional</a:t>
+            </a:r>
+            <a:r>
+              <a:rPr lang="en-SG" b="1" u="sng" dirty="0"/>
+              <a:t> UI &amp; Email</a:t>
+            </a:r>
+          </a:p>
+        </p:txBody>
+      </p:sp>
+    </p:spTree>
+    <p:extLst>
+      <p:ext uri="{BB962C8B-B14F-4D97-AF65-F5344CB8AC3E}">
+        <p14:creationId xmlns:p14="http://schemas.microsoft.com/office/powerpoint/2010/main" val="546075246"/>
+      </p:ext>
+    </p:extLst>
+  </p:cSld>
+  <p:clrMapOvr>
+    <a:masterClrMapping/>
+  </p:clrMapOvr>
+</p:sld>
+</file>
+
+<file path=ppt/slides/slide6.xml><?xml version="1.0" encoding="utf-8"?>
+<p:sld xmlns:a="http://schemas.openxmlformats.org/drawingml/2006/main" xmlns:r="http://schemas.openxmlformats.org/officeDocument/2006/relationships" xmlns:p="http://schemas.openxmlformats.org/presentationml/2006/main">
+  <p:cSld>
+    <p:spTree>
+      <p:nvGrpSpPr>
+        <p:cNvPr id="1" name=""/>
+        <p:cNvGrpSpPr/>
+        <p:nvPr/>
+      </p:nvGrpSpPr>
+      <p:grpSpPr>
+        <a:xfrm>
+          <a:off x="0" y="0"/>
+          <a:ext cx="0" cy="0"/>
+          <a:chOff x="0" y="0"/>
+          <a:chExt cx="0" cy="0"/>
+        </a:xfrm>
+      </p:grpSpPr>
+      <p:sp>
+        <p:nvSpPr>
+          <p:cNvPr id="24" name="TextBox 23">
+            <a:extLst>
+              <a:ext uri="{FF2B5EF4-FFF2-40B4-BE49-F238E27FC236}">
+                <a16:creationId xmlns:a16="http://schemas.microsoft.com/office/drawing/2014/main" id="{2728A82E-EB67-4925-A5D2-8F2ECE0F7D1B}"/>
+              </a:ext>
+            </a:extLst>
+          </p:cNvPr>
+          <p:cNvSpPr txBox="1"/>
+          <p:nvPr/>
+        </p:nvSpPr>
+        <p:spPr>
+          <a:xfrm>
+            <a:off x="597160" y="251927"/>
+            <a:ext cx="6012352" cy="369332"/>
+          </a:xfrm>
+          <a:prstGeom prst="rect">
+            <a:avLst/>
+          </a:prstGeom>
+          <a:noFill/>
+        </p:spPr>
+        <p:txBody>
+          <a:bodyPr wrap="none" rtlCol="0">
+            <a:spAutoFit/>
+          </a:bodyPr>
+          <a:lstStyle/>
+          <a:p>
+            <a:r>
+              <a:rPr lang="en-SG" b="1" u="sng" dirty="0"/>
+              <a:t>NLB Availability Checker &amp; Amazon Recommendation System</a:t>
+            </a:r>
+          </a:p>
+        </p:txBody>
+      </p:sp>
+    </p:spTree>
+    <p:extLst>
+      <p:ext uri="{BB962C8B-B14F-4D97-AF65-F5344CB8AC3E}">
+        <p14:creationId xmlns:p14="http://schemas.microsoft.com/office/powerpoint/2010/main" val="2484795649"/>
+      </p:ext>
+    </p:extLst>
+  </p:cSld>
+  <p:clrMapOvr>
+    <a:masterClrMapping/>
+  </p:clrMapOvr>
+</p:sld>
+</file>
+
+<file path=ppt/slides/slide7.xml><?xml version="1.0" encoding="utf-8"?>
+<p:sld xmlns:a="http://schemas.openxmlformats.org/drawingml/2006/main" xmlns:r="http://schemas.openxmlformats.org/officeDocument/2006/relationships" xmlns:p="http://schemas.openxmlformats.org/presentationml/2006/main">
+  <p:cSld>
+    <p:spTree>
+      <p:nvGrpSpPr>
+        <p:cNvPr id="1" name=""/>
+        <p:cNvGrpSpPr/>
+        <p:nvPr/>
+      </p:nvGrpSpPr>
+      <p:grpSpPr>
+        <a:xfrm>
+          <a:off x="0" y="0"/>
+          <a:ext cx="0" cy="0"/>
+          <a:chOff x="0" y="0"/>
+          <a:chExt cx="0" cy="0"/>
+        </a:xfrm>
+      </p:grpSpPr>
+      <p:sp>
+        <p:nvSpPr>
+          <p:cNvPr id="24" name="TextBox 23">
+            <a:extLst>
+              <a:ext uri="{FF2B5EF4-FFF2-40B4-BE49-F238E27FC236}">
+                <a16:creationId xmlns:a16="http://schemas.microsoft.com/office/drawing/2014/main" id="{2728A82E-EB67-4925-A5D2-8F2ECE0F7D1B}"/>
+              </a:ext>
+            </a:extLst>
+          </p:cNvPr>
+          <p:cNvSpPr txBox="1"/>
+          <p:nvPr/>
+        </p:nvSpPr>
+        <p:spPr>
+          <a:xfrm>
+            <a:off x="597160" y="251927"/>
+            <a:ext cx="4747903" cy="369332"/>
+          </a:xfrm>
+          <a:prstGeom prst="rect">
+            <a:avLst/>
+          </a:prstGeom>
+          <a:noFill/>
+        </p:spPr>
+        <p:txBody>
+          <a:bodyPr wrap="none" rtlCol="0">
+            <a:spAutoFit/>
+          </a:bodyPr>
+          <a:lstStyle/>
+          <a:p>
+            <a:r>
+              <a:rPr lang="en-SG" b="1" u="sng" dirty="0"/>
+              <a:t>Intelligent Title Matcher &amp; Abstract Summarizer</a:t>
+            </a:r>
+          </a:p>
+        </p:txBody>
+      </p:sp>
+    </p:spTree>
+    <p:extLst>
+      <p:ext uri="{BB962C8B-B14F-4D97-AF65-F5344CB8AC3E}">
+        <p14:creationId xmlns:p14="http://schemas.microsoft.com/office/powerpoint/2010/main" val="3018560542"/>
+      </p:ext>
+    </p:extLst>
+  </p:cSld>
+  <p:clrMapOvr>
+    <a:masterClrMapping/>
+  </p:clrMapOvr>
+</p:sld>
+</file>
+
 <file path=ppt/theme/theme1.xml><?xml version="1.0" encoding="utf-8"?>
 <a:theme xmlns:a="http://schemas.openxmlformats.org/drawingml/2006/main" name="Office Theme">
   <a:themeElements>

</xml_diff>

<commit_message>
Update ISS IPA PROJECT PRESENTATION - SYSTEM ARCHITECTURE.pptx
</commit_message>
<xml_diff>
--- a/Video/ISS IPA PROJECT PRESENTATION - SYSTEM ARCHITECTURE.pptx
+++ b/Video/ISS IPA PROJECT PRESENTATION - SYSTEM ARCHITECTURE.pptx
@@ -10840,6 +10840,1003 @@
           </a:p>
         </p:txBody>
       </p:sp>
+      <p:pic>
+        <p:nvPicPr>
+          <p:cNvPr id="21" name="Picture 20">
+            <a:extLst>
+              <a:ext uri="{FF2B5EF4-FFF2-40B4-BE49-F238E27FC236}">
+                <a16:creationId xmlns:a16="http://schemas.microsoft.com/office/drawing/2014/main" id="{FBDBF0E6-7A69-44FD-A398-6AB0FF618B4C}"/>
+              </a:ext>
+            </a:extLst>
+          </p:cNvPr>
+          <p:cNvPicPr>
+            <a:picLocks noChangeAspect="1"/>
+          </p:cNvPicPr>
+          <p:nvPr/>
+        </p:nvPicPr>
+        <p:blipFill rotWithShape="1">
+          <a:blip r:embed="rId8" cstate="print">
+            <a:extLst>
+              <a:ext uri="{28A0092B-C50C-407E-A947-70E740481C1C}">
+                <a14:useLocalDpi xmlns:a14="http://schemas.microsoft.com/office/drawing/2010/main" val="0"/>
+              </a:ext>
+            </a:extLst>
+          </a:blip>
+          <a:srcRect t="55444" b="23031"/>
+          <a:stretch/>
+        </p:blipFill>
+        <p:spPr bwMode="auto">
+          <a:xfrm>
+            <a:off x="3016692" y="3167099"/>
+            <a:ext cx="2286000" cy="1066238"/>
+          </a:xfrm>
+          <a:prstGeom prst="rect">
+            <a:avLst/>
+          </a:prstGeom>
+          <a:noFill/>
+          <a:ln>
+            <a:noFill/>
+          </a:ln>
+          <a:effectLst>
+            <a:outerShdw blurRad="50800" dist="38100" dir="2700000" algn="tl" rotWithShape="0">
+              <a:prstClr val="black">
+                <a:alpha val="40000"/>
+              </a:prstClr>
+            </a:outerShdw>
+          </a:effectLst>
+        </p:spPr>
+      </p:pic>
+      <p:sp>
+        <p:nvSpPr>
+          <p:cNvPr id="26" name="Arrow: Right 25">
+            <a:extLst>
+              <a:ext uri="{FF2B5EF4-FFF2-40B4-BE49-F238E27FC236}">
+                <a16:creationId xmlns:a16="http://schemas.microsoft.com/office/drawing/2014/main" id="{ACAF8BE2-7213-4FD6-B3DD-A4F2AD434C3A}"/>
+              </a:ext>
+            </a:extLst>
+          </p:cNvPr>
+          <p:cNvSpPr/>
+          <p:nvPr/>
+        </p:nvSpPr>
+        <p:spPr>
+          <a:xfrm rot="5400000" flipV="1">
+            <a:off x="4552881" y="2807188"/>
+            <a:ext cx="549983" cy="536373"/>
+          </a:xfrm>
+          <a:prstGeom prst="rightArrow">
+            <a:avLst/>
+          </a:prstGeom>
+          <a:solidFill>
+            <a:srgbClr val="002060"/>
+          </a:solidFill>
+          <a:effectLst>
+            <a:outerShdw blurRad="50800" dist="38100" dir="2700000" algn="tl" rotWithShape="0">
+              <a:prstClr val="black">
+                <a:alpha val="40000"/>
+              </a:prstClr>
+            </a:outerShdw>
+          </a:effectLst>
+        </p:spPr>
+        <p:style>
+          <a:lnRef idx="2">
+            <a:schemeClr val="accent1">
+              <a:shade val="50000"/>
+            </a:schemeClr>
+          </a:lnRef>
+          <a:fillRef idx="1">
+            <a:schemeClr val="accent1"/>
+          </a:fillRef>
+          <a:effectRef idx="0">
+            <a:schemeClr val="accent1"/>
+          </a:effectRef>
+          <a:fontRef idx="minor">
+            <a:schemeClr val="lt1"/>
+          </a:fontRef>
+        </p:style>
+        <p:txBody>
+          <a:bodyPr rtlCol="0" anchor="ctr"/>
+          <a:lstStyle/>
+          <a:p>
+            <a:pPr algn="ctr"/>
+            <a:r>
+              <a:rPr lang="en-US" sz="1200" dirty="0"/>
+              <a:t>No</a:t>
+            </a:r>
+            <a:endParaRPr lang="en-GB" sz="1200" dirty="0"/>
+          </a:p>
+        </p:txBody>
+      </p:sp>
+      <p:sp>
+        <p:nvSpPr>
+          <p:cNvPr id="27" name="TextBox 26">
+            <a:extLst>
+              <a:ext uri="{FF2B5EF4-FFF2-40B4-BE49-F238E27FC236}">
+                <a16:creationId xmlns:a16="http://schemas.microsoft.com/office/drawing/2014/main" id="{9B228543-F979-4591-88EF-91AC725D2762}"/>
+              </a:ext>
+            </a:extLst>
+          </p:cNvPr>
+          <p:cNvSpPr txBox="1"/>
+          <p:nvPr/>
+        </p:nvSpPr>
+        <p:spPr>
+          <a:xfrm>
+            <a:off x="4009394" y="4076409"/>
+            <a:ext cx="995530" cy="261610"/>
+          </a:xfrm>
+          <a:prstGeom prst="rect">
+            <a:avLst/>
+          </a:prstGeom>
+          <a:solidFill>
+            <a:schemeClr val="accent4">
+              <a:lumMod val="40000"/>
+              <a:lumOff val="60000"/>
+            </a:schemeClr>
+          </a:solidFill>
+          <a:ln>
+            <a:solidFill>
+              <a:schemeClr val="tx1"/>
+            </a:solidFill>
+          </a:ln>
+          <a:effectLst>
+            <a:outerShdw blurRad="50800" dist="38100" dir="2700000" algn="tl" rotWithShape="0">
+              <a:prstClr val="black">
+                <a:alpha val="40000"/>
+              </a:prstClr>
+            </a:outerShdw>
+          </a:effectLst>
+        </p:spPr>
+        <p:txBody>
+          <a:bodyPr wrap="square" rtlCol="0">
+            <a:spAutoFit/>
+          </a:bodyPr>
+          <a:lstStyle/>
+          <a:p>
+            <a:pPr algn="ctr"/>
+            <a:r>
+              <a:rPr lang="en-US" sz="1100" dirty="0"/>
+              <a:t>Reset Context</a:t>
+            </a:r>
+          </a:p>
+        </p:txBody>
+      </p:sp>
+      <p:sp>
+        <p:nvSpPr>
+          <p:cNvPr id="29" name="Arrow: Right 28">
+            <a:extLst>
+              <a:ext uri="{FF2B5EF4-FFF2-40B4-BE49-F238E27FC236}">
+                <a16:creationId xmlns:a16="http://schemas.microsoft.com/office/drawing/2014/main" id="{F2F2444D-B929-4904-A454-339CEBB4F431}"/>
+              </a:ext>
+            </a:extLst>
+          </p:cNvPr>
+          <p:cNvSpPr/>
+          <p:nvPr/>
+        </p:nvSpPr>
+        <p:spPr>
+          <a:xfrm>
+            <a:off x="7821318" y="3007707"/>
+            <a:ext cx="1367855" cy="536373"/>
+          </a:xfrm>
+          <a:prstGeom prst="rightArrow">
+            <a:avLst/>
+          </a:prstGeom>
+          <a:solidFill>
+            <a:srgbClr val="002060"/>
+          </a:solidFill>
+          <a:effectLst>
+            <a:outerShdw blurRad="50800" dist="38100" dir="2700000" algn="tl" rotWithShape="0">
+              <a:prstClr val="black">
+                <a:alpha val="40000"/>
+              </a:prstClr>
+            </a:outerShdw>
+          </a:effectLst>
+        </p:spPr>
+        <p:style>
+          <a:lnRef idx="2">
+            <a:schemeClr val="accent1">
+              <a:shade val="50000"/>
+            </a:schemeClr>
+          </a:lnRef>
+          <a:fillRef idx="1">
+            <a:schemeClr val="accent1"/>
+          </a:fillRef>
+          <a:effectRef idx="0">
+            <a:schemeClr val="accent1"/>
+          </a:effectRef>
+          <a:fontRef idx="minor">
+            <a:schemeClr val="lt1"/>
+          </a:fontRef>
+        </p:style>
+        <p:txBody>
+          <a:bodyPr rtlCol="0" anchor="ctr"/>
+          <a:lstStyle/>
+          <a:p>
+            <a:pPr algn="ctr"/>
+            <a:r>
+              <a:rPr lang="en-US" sz="1200" dirty="0"/>
+              <a:t>Add to Book List</a:t>
+            </a:r>
+            <a:endParaRPr lang="en-GB" sz="1200" dirty="0"/>
+          </a:p>
+        </p:txBody>
+      </p:sp>
+      <p:sp>
+        <p:nvSpPr>
+          <p:cNvPr id="30" name="Arrow: Right 29">
+            <a:extLst>
+              <a:ext uri="{FF2B5EF4-FFF2-40B4-BE49-F238E27FC236}">
+                <a16:creationId xmlns:a16="http://schemas.microsoft.com/office/drawing/2014/main" id="{93ABB3EE-02BF-496E-98D1-8B9DBF5B60FB}"/>
+              </a:ext>
+            </a:extLst>
+          </p:cNvPr>
+          <p:cNvSpPr/>
+          <p:nvPr/>
+        </p:nvSpPr>
+        <p:spPr>
+          <a:xfrm rot="10800000" flipV="1">
+            <a:off x="5011287" y="3637590"/>
+            <a:ext cx="685390" cy="536373"/>
+          </a:xfrm>
+          <a:prstGeom prst="rightArrow">
+            <a:avLst/>
+          </a:prstGeom>
+          <a:solidFill>
+            <a:srgbClr val="002060"/>
+          </a:solidFill>
+          <a:effectLst>
+            <a:outerShdw blurRad="50800" dist="38100" dir="2700000" algn="tl" rotWithShape="0">
+              <a:prstClr val="black">
+                <a:alpha val="40000"/>
+              </a:prstClr>
+            </a:outerShdw>
+          </a:effectLst>
+        </p:spPr>
+        <p:style>
+          <a:lnRef idx="2">
+            <a:schemeClr val="accent1">
+              <a:shade val="50000"/>
+            </a:schemeClr>
+          </a:lnRef>
+          <a:fillRef idx="1">
+            <a:schemeClr val="accent1"/>
+          </a:fillRef>
+          <a:effectRef idx="0">
+            <a:schemeClr val="accent1"/>
+          </a:effectRef>
+          <a:fontRef idx="minor">
+            <a:schemeClr val="lt1"/>
+          </a:fontRef>
+        </p:style>
+        <p:txBody>
+          <a:bodyPr rtlCol="0" anchor="ctr"/>
+          <a:lstStyle/>
+          <a:p>
+            <a:pPr algn="ctr"/>
+            <a:r>
+              <a:rPr lang="en-US" sz="1200" dirty="0"/>
+              <a:t>No</a:t>
+            </a:r>
+            <a:endParaRPr lang="en-GB" sz="1200" dirty="0"/>
+          </a:p>
+        </p:txBody>
+      </p:sp>
+      <p:pic>
+        <p:nvPicPr>
+          <p:cNvPr id="31" name="Picture 30">
+            <a:extLst>
+              <a:ext uri="{FF2B5EF4-FFF2-40B4-BE49-F238E27FC236}">
+                <a16:creationId xmlns:a16="http://schemas.microsoft.com/office/drawing/2014/main" id="{A3CB3C79-D0E6-4EB6-BD84-637BA8583EEA}"/>
+              </a:ext>
+            </a:extLst>
+          </p:cNvPr>
+          <p:cNvPicPr>
+            <a:picLocks noChangeAspect="1"/>
+          </p:cNvPicPr>
+          <p:nvPr/>
+        </p:nvPicPr>
+        <p:blipFill rotWithShape="1">
+          <a:blip r:embed="rId3" cstate="print">
+            <a:extLst>
+              <a:ext uri="{28A0092B-C50C-407E-A947-70E740481C1C}">
+                <a14:useLocalDpi xmlns:a14="http://schemas.microsoft.com/office/drawing/2010/main" val="0"/>
+              </a:ext>
+            </a:extLst>
+          </a:blip>
+          <a:srcRect t="54379" b="22010"/>
+          <a:stretch/>
+        </p:blipFill>
+        <p:spPr bwMode="auto">
+          <a:xfrm>
+            <a:off x="5580182" y="4385554"/>
+            <a:ext cx="2286000" cy="1169956"/>
+          </a:xfrm>
+          <a:prstGeom prst="rect">
+            <a:avLst/>
+          </a:prstGeom>
+          <a:noFill/>
+          <a:ln>
+            <a:noFill/>
+          </a:ln>
+          <a:effectLst>
+            <a:outerShdw blurRad="50800" dist="38100" dir="2700000" algn="tl" rotWithShape="0">
+              <a:prstClr val="black">
+                <a:alpha val="40000"/>
+              </a:prstClr>
+            </a:outerShdw>
+          </a:effectLst>
+        </p:spPr>
+      </p:pic>
+      <p:sp>
+        <p:nvSpPr>
+          <p:cNvPr id="32" name="TextBox 31">
+            <a:extLst>
+              <a:ext uri="{FF2B5EF4-FFF2-40B4-BE49-F238E27FC236}">
+                <a16:creationId xmlns:a16="http://schemas.microsoft.com/office/drawing/2014/main" id="{F7899094-ECCA-4982-983D-DF2444E4C4DA}"/>
+              </a:ext>
+            </a:extLst>
+          </p:cNvPr>
+          <p:cNvSpPr txBox="1"/>
+          <p:nvPr/>
+        </p:nvSpPr>
+        <p:spPr>
+          <a:xfrm>
+            <a:off x="7104418" y="5324351"/>
+            <a:ext cx="995530" cy="261610"/>
+          </a:xfrm>
+          <a:prstGeom prst="rect">
+            <a:avLst/>
+          </a:prstGeom>
+          <a:solidFill>
+            <a:schemeClr val="accent4">
+              <a:lumMod val="40000"/>
+              <a:lumOff val="60000"/>
+            </a:schemeClr>
+          </a:solidFill>
+          <a:ln>
+            <a:solidFill>
+              <a:schemeClr val="tx1"/>
+            </a:solidFill>
+          </a:ln>
+          <a:effectLst>
+            <a:outerShdw blurRad="50800" dist="38100" dir="2700000" algn="tl" rotWithShape="0">
+              <a:prstClr val="black">
+                <a:alpha val="40000"/>
+              </a:prstClr>
+            </a:outerShdw>
+          </a:effectLst>
+        </p:spPr>
+        <p:txBody>
+          <a:bodyPr wrap="square" rtlCol="0">
+            <a:spAutoFit/>
+          </a:bodyPr>
+          <a:lstStyle/>
+          <a:p>
+            <a:pPr algn="ctr"/>
+            <a:r>
+              <a:rPr lang="en-US" sz="1100" dirty="0"/>
+              <a:t>Reset Context</a:t>
+            </a:r>
+          </a:p>
+        </p:txBody>
+      </p:sp>
+      <p:sp>
+        <p:nvSpPr>
+          <p:cNvPr id="33" name="Arrow: Right 32">
+            <a:extLst>
+              <a:ext uri="{FF2B5EF4-FFF2-40B4-BE49-F238E27FC236}">
+                <a16:creationId xmlns:a16="http://schemas.microsoft.com/office/drawing/2014/main" id="{D8390B4D-897A-4201-9DC5-602FE5057D00}"/>
+              </a:ext>
+            </a:extLst>
+          </p:cNvPr>
+          <p:cNvSpPr/>
+          <p:nvPr/>
+        </p:nvSpPr>
+        <p:spPr>
+          <a:xfrm rot="5400000" flipV="1">
+            <a:off x="6255263" y="4144474"/>
+            <a:ext cx="536373" cy="536373"/>
+          </a:xfrm>
+          <a:prstGeom prst="rightArrow">
+            <a:avLst/>
+          </a:prstGeom>
+          <a:solidFill>
+            <a:srgbClr val="002060"/>
+          </a:solidFill>
+          <a:effectLst>
+            <a:outerShdw blurRad="50800" dist="38100" dir="2700000" algn="tl" rotWithShape="0">
+              <a:prstClr val="black">
+                <a:alpha val="40000"/>
+              </a:prstClr>
+            </a:outerShdw>
+          </a:effectLst>
+        </p:spPr>
+        <p:style>
+          <a:lnRef idx="2">
+            <a:schemeClr val="accent1">
+              <a:shade val="50000"/>
+            </a:schemeClr>
+          </a:lnRef>
+          <a:fillRef idx="1">
+            <a:schemeClr val="accent1"/>
+          </a:fillRef>
+          <a:effectRef idx="0">
+            <a:schemeClr val="accent1"/>
+          </a:effectRef>
+          <a:fontRef idx="minor">
+            <a:schemeClr val="lt1"/>
+          </a:fontRef>
+        </p:style>
+        <p:txBody>
+          <a:bodyPr rtlCol="0" anchor="ctr"/>
+          <a:lstStyle/>
+          <a:p>
+            <a:pPr algn="ctr"/>
+            <a:r>
+              <a:rPr lang="en-US" sz="1200" dirty="0"/>
+              <a:t>Yes</a:t>
+            </a:r>
+            <a:endParaRPr lang="en-GB" sz="1200" dirty="0"/>
+          </a:p>
+        </p:txBody>
+      </p:sp>
+      <p:sp>
+        <p:nvSpPr>
+          <p:cNvPr id="34" name="TextBox 33">
+            <a:extLst>
+              <a:ext uri="{FF2B5EF4-FFF2-40B4-BE49-F238E27FC236}">
+                <a16:creationId xmlns:a16="http://schemas.microsoft.com/office/drawing/2014/main" id="{20752D73-CB18-44E9-98C1-4E5F8FACA9BF}"/>
+              </a:ext>
+            </a:extLst>
+          </p:cNvPr>
+          <p:cNvSpPr txBox="1"/>
+          <p:nvPr/>
+        </p:nvSpPr>
+        <p:spPr>
+          <a:xfrm>
+            <a:off x="7523813" y="3567080"/>
+            <a:ext cx="1501951" cy="600164"/>
+          </a:xfrm>
+          <a:prstGeom prst="rect">
+            <a:avLst/>
+          </a:prstGeom>
+          <a:solidFill>
+            <a:schemeClr val="accent5">
+              <a:lumMod val="20000"/>
+              <a:lumOff val="80000"/>
+            </a:schemeClr>
+          </a:solidFill>
+          <a:ln>
+            <a:solidFill>
+              <a:schemeClr val="tx1"/>
+            </a:solidFill>
+          </a:ln>
+          <a:effectLst>
+            <a:outerShdw blurRad="50800" dist="38100" dir="2700000" algn="tl" rotWithShape="0">
+              <a:prstClr val="black">
+                <a:alpha val="40000"/>
+              </a:prstClr>
+            </a:outerShdw>
+          </a:effectLst>
+        </p:spPr>
+        <p:txBody>
+          <a:bodyPr wrap="square" rtlCol="0">
+            <a:spAutoFit/>
+          </a:bodyPr>
+          <a:lstStyle/>
+          <a:p>
+            <a:pPr algn="ctr"/>
+            <a:r>
+              <a:rPr lang="en-US" sz="1100" dirty="0"/>
+              <a:t>Set Output Context: </a:t>
+            </a:r>
+          </a:p>
+          <a:p>
+            <a:pPr algn="ctr"/>
+            <a:r>
+              <a:rPr lang="en-US" sz="1100" dirty="0"/>
+              <a:t>Follow up context – yes, no</a:t>
+            </a:r>
+            <a:endParaRPr lang="en-GB" sz="1100" dirty="0"/>
+          </a:p>
+        </p:txBody>
+      </p:sp>
+      <p:sp>
+        <p:nvSpPr>
+          <p:cNvPr id="35" name="Arrow: Right 34">
+            <a:extLst>
+              <a:ext uri="{FF2B5EF4-FFF2-40B4-BE49-F238E27FC236}">
+                <a16:creationId xmlns:a16="http://schemas.microsoft.com/office/drawing/2014/main" id="{EBF46B02-B016-4F27-A97E-7324AB1472EB}"/>
+              </a:ext>
+            </a:extLst>
+          </p:cNvPr>
+          <p:cNvSpPr/>
+          <p:nvPr/>
+        </p:nvSpPr>
+        <p:spPr>
+          <a:xfrm rot="5400000" flipV="1">
+            <a:off x="5638145" y="2803858"/>
+            <a:ext cx="549984" cy="536373"/>
+          </a:xfrm>
+          <a:prstGeom prst="rightArrow">
+            <a:avLst/>
+          </a:prstGeom>
+          <a:solidFill>
+            <a:srgbClr val="002060"/>
+          </a:solidFill>
+          <a:effectLst>
+            <a:outerShdw blurRad="50800" dist="38100" dir="2700000" algn="tl" rotWithShape="0">
+              <a:prstClr val="black">
+                <a:alpha val="40000"/>
+              </a:prstClr>
+            </a:outerShdw>
+          </a:effectLst>
+        </p:spPr>
+        <p:style>
+          <a:lnRef idx="2">
+            <a:schemeClr val="accent1">
+              <a:shade val="50000"/>
+            </a:schemeClr>
+          </a:lnRef>
+          <a:fillRef idx="1">
+            <a:schemeClr val="accent1"/>
+          </a:fillRef>
+          <a:effectRef idx="0">
+            <a:schemeClr val="accent1"/>
+          </a:effectRef>
+          <a:fontRef idx="minor">
+            <a:schemeClr val="lt1"/>
+          </a:fontRef>
+        </p:style>
+        <p:txBody>
+          <a:bodyPr rtlCol="0" anchor="ctr"/>
+          <a:lstStyle/>
+          <a:p>
+            <a:pPr algn="ctr"/>
+            <a:r>
+              <a:rPr lang="en-US" sz="1200" dirty="0"/>
+              <a:t>Yes</a:t>
+            </a:r>
+            <a:endParaRPr lang="en-GB" sz="1200" dirty="0"/>
+          </a:p>
+        </p:txBody>
+      </p:sp>
+      <p:sp>
+        <p:nvSpPr>
+          <p:cNvPr id="37" name="TextBox 36">
+            <a:extLst>
+              <a:ext uri="{FF2B5EF4-FFF2-40B4-BE49-F238E27FC236}">
+                <a16:creationId xmlns:a16="http://schemas.microsoft.com/office/drawing/2014/main" id="{25815E41-4245-4666-B130-583D59D97CD2}"/>
+              </a:ext>
+            </a:extLst>
+          </p:cNvPr>
+          <p:cNvSpPr txBox="1"/>
+          <p:nvPr/>
+        </p:nvSpPr>
+        <p:spPr>
+          <a:xfrm>
+            <a:off x="7887225" y="4719634"/>
+            <a:ext cx="995530" cy="261610"/>
+          </a:xfrm>
+          <a:prstGeom prst="rect">
+            <a:avLst/>
+          </a:prstGeom>
+          <a:solidFill>
+            <a:schemeClr val="accent6">
+              <a:lumMod val="60000"/>
+              <a:lumOff val="40000"/>
+            </a:schemeClr>
+          </a:solidFill>
+          <a:ln>
+            <a:solidFill>
+              <a:schemeClr val="tx1"/>
+            </a:solidFill>
+          </a:ln>
+          <a:effectLst>
+            <a:outerShdw blurRad="50800" dist="38100" dir="2700000" algn="tl" rotWithShape="0">
+              <a:prstClr val="black">
+                <a:alpha val="40000"/>
+              </a:prstClr>
+            </a:outerShdw>
+          </a:effectLst>
+        </p:spPr>
+        <p:txBody>
+          <a:bodyPr wrap="square" rtlCol="0">
+            <a:spAutoFit/>
+          </a:bodyPr>
+          <a:lstStyle/>
+          <a:p>
+            <a:pPr algn="ctr"/>
+            <a:r>
+              <a:rPr lang="en-US" sz="1100" dirty="0"/>
+              <a:t>Book List Full</a:t>
+            </a:r>
+          </a:p>
+        </p:txBody>
+      </p:sp>
+      <p:sp>
+        <p:nvSpPr>
+          <p:cNvPr id="38" name="Arrow: Right 37">
+            <a:extLst>
+              <a:ext uri="{FF2B5EF4-FFF2-40B4-BE49-F238E27FC236}">
+                <a16:creationId xmlns:a16="http://schemas.microsoft.com/office/drawing/2014/main" id="{4B91CFD3-F33A-486D-9D60-A28F6ADDCC6B}"/>
+              </a:ext>
+            </a:extLst>
+          </p:cNvPr>
+          <p:cNvSpPr/>
+          <p:nvPr/>
+        </p:nvSpPr>
+        <p:spPr>
+          <a:xfrm>
+            <a:off x="7821318" y="4302726"/>
+            <a:ext cx="1367855" cy="536373"/>
+          </a:xfrm>
+          <a:prstGeom prst="rightArrow">
+            <a:avLst/>
+          </a:prstGeom>
+          <a:solidFill>
+            <a:srgbClr val="002060"/>
+          </a:solidFill>
+          <a:effectLst>
+            <a:outerShdw blurRad="50800" dist="38100" dir="2700000" algn="tl" rotWithShape="0">
+              <a:prstClr val="black">
+                <a:alpha val="40000"/>
+              </a:prstClr>
+            </a:outerShdw>
+          </a:effectLst>
+        </p:spPr>
+        <p:style>
+          <a:lnRef idx="2">
+            <a:schemeClr val="accent1">
+              <a:shade val="50000"/>
+            </a:schemeClr>
+          </a:lnRef>
+          <a:fillRef idx="1">
+            <a:schemeClr val="accent1"/>
+          </a:fillRef>
+          <a:effectRef idx="0">
+            <a:schemeClr val="accent1"/>
+          </a:effectRef>
+          <a:fontRef idx="minor">
+            <a:schemeClr val="lt1"/>
+          </a:fontRef>
+        </p:style>
+        <p:txBody>
+          <a:bodyPr rtlCol="0" anchor="ctr"/>
+          <a:lstStyle/>
+          <a:p>
+            <a:pPr algn="ctr"/>
+            <a:r>
+              <a:rPr lang="en-US" sz="1200" dirty="0"/>
+              <a:t>Add to Book List</a:t>
+            </a:r>
+            <a:endParaRPr lang="en-GB" sz="1200" dirty="0"/>
+          </a:p>
+        </p:txBody>
+      </p:sp>
+      <p:sp>
+        <p:nvSpPr>
+          <p:cNvPr id="45" name="Arrow: Right 44">
+            <a:extLst>
+              <a:ext uri="{FF2B5EF4-FFF2-40B4-BE49-F238E27FC236}">
+                <a16:creationId xmlns:a16="http://schemas.microsoft.com/office/drawing/2014/main" id="{57C5FF74-CC8D-4A60-BD69-96FE1E07CB02}"/>
+              </a:ext>
+            </a:extLst>
+          </p:cNvPr>
+          <p:cNvSpPr/>
+          <p:nvPr/>
+        </p:nvSpPr>
+        <p:spPr>
+          <a:xfrm>
+            <a:off x="9153632" y="5253751"/>
+            <a:ext cx="1146934" cy="778152"/>
+          </a:xfrm>
+          <a:prstGeom prst="rightArrow">
+            <a:avLst/>
+          </a:prstGeom>
+          <a:noFill/>
+          <a:ln w="28575">
+            <a:prstDash val="sysDash"/>
+          </a:ln>
+        </p:spPr>
+        <p:style>
+          <a:lnRef idx="2">
+            <a:schemeClr val="accent1">
+              <a:shade val="50000"/>
+            </a:schemeClr>
+          </a:lnRef>
+          <a:fillRef idx="1">
+            <a:schemeClr val="accent1"/>
+          </a:fillRef>
+          <a:effectRef idx="0">
+            <a:schemeClr val="accent1"/>
+          </a:effectRef>
+          <a:fontRef idx="minor">
+            <a:schemeClr val="lt1"/>
+          </a:fontRef>
+        </p:style>
+        <p:txBody>
+          <a:bodyPr rtlCol="0" anchor="ctr"/>
+          <a:lstStyle/>
+          <a:p>
+            <a:pPr algn="ctr"/>
+            <a:r>
+              <a:rPr lang="en-US" sz="1200" dirty="0">
+                <a:solidFill>
+                  <a:sysClr val="windowText" lastClr="000000"/>
+                </a:solidFill>
+              </a:rPr>
+              <a:t>Triggers RPA Thread</a:t>
+            </a:r>
+            <a:endParaRPr lang="en-GB" sz="1200" dirty="0">
+              <a:solidFill>
+                <a:sysClr val="windowText" lastClr="000000"/>
+              </a:solidFill>
+            </a:endParaRPr>
+          </a:p>
+        </p:txBody>
+      </p:sp>
+      <p:pic>
+        <p:nvPicPr>
+          <p:cNvPr id="2052" name="Picture 4" descr="Installing Python 3 and Flask on GoDaddy | by Jordan Ireland | Towards Data  Science">
+            <a:extLst>
+              <a:ext uri="{FF2B5EF4-FFF2-40B4-BE49-F238E27FC236}">
+                <a16:creationId xmlns:a16="http://schemas.microsoft.com/office/drawing/2014/main" id="{E7B51BE6-C414-4D90-B1A9-59C0B0B78DFD}"/>
+              </a:ext>
+            </a:extLst>
+          </p:cNvPr>
+          <p:cNvPicPr>
+            <a:picLocks noChangeAspect="1" noChangeArrowheads="1"/>
+          </p:cNvPicPr>
+          <p:nvPr/>
+        </p:nvPicPr>
+        <p:blipFill>
+          <a:blip r:embed="rId9">
+            <a:extLst>
+              <a:ext uri="{28A0092B-C50C-407E-A947-70E740481C1C}">
+                <a14:useLocalDpi xmlns:a14="http://schemas.microsoft.com/office/drawing/2010/main" val="0"/>
+              </a:ext>
+            </a:extLst>
+          </a:blip>
+          <a:srcRect/>
+          <a:stretch>
+            <a:fillRect/>
+          </a:stretch>
+        </p:blipFill>
+        <p:spPr bwMode="auto">
+          <a:xfrm>
+            <a:off x="9116521" y="24656"/>
+            <a:ext cx="899277" cy="562048"/>
+          </a:xfrm>
+          <a:prstGeom prst="rect">
+            <a:avLst/>
+          </a:prstGeom>
+          <a:noFill/>
+          <a:extLst>
+            <a:ext uri="{909E8E84-426E-40DD-AFC4-6F175D3DCCD1}">
+              <a14:hiddenFill xmlns:a14="http://schemas.microsoft.com/office/drawing/2010/main">
+                <a:solidFill>
+                  <a:srgbClr val="FFFFFF"/>
+                </a:solidFill>
+              </a14:hiddenFill>
+            </a:ext>
+          </a:extLst>
+        </p:spPr>
+      </p:pic>
+      <p:pic>
+        <p:nvPicPr>
+          <p:cNvPr id="2054" name="Picture 6" descr="Release 6.14.0">
+            <a:extLst>
+              <a:ext uri="{FF2B5EF4-FFF2-40B4-BE49-F238E27FC236}">
+                <a16:creationId xmlns:a16="http://schemas.microsoft.com/office/drawing/2014/main" id="{25E97357-572E-4F6B-B05A-EBD92BEAD89F}"/>
+              </a:ext>
+            </a:extLst>
+          </p:cNvPr>
+          <p:cNvPicPr>
+            <a:picLocks noChangeAspect="1" noChangeArrowheads="1"/>
+          </p:cNvPicPr>
+          <p:nvPr/>
+        </p:nvPicPr>
+        <p:blipFill>
+          <a:blip r:embed="rId10">
+            <a:extLst>
+              <a:ext uri="{28A0092B-C50C-407E-A947-70E740481C1C}">
+                <a14:useLocalDpi xmlns:a14="http://schemas.microsoft.com/office/drawing/2010/main" val="0"/>
+              </a:ext>
+            </a:extLst>
+          </a:blip>
+          <a:srcRect/>
+          <a:stretch>
+            <a:fillRect/>
+          </a:stretch>
+        </p:blipFill>
+        <p:spPr bwMode="auto">
+          <a:xfrm>
+            <a:off x="10263217" y="4837170"/>
+            <a:ext cx="982211" cy="360056"/>
+          </a:xfrm>
+          <a:prstGeom prst="rect">
+            <a:avLst/>
+          </a:prstGeom>
+          <a:noFill/>
+          <a:extLst>
+            <a:ext uri="{909E8E84-426E-40DD-AFC4-6F175D3DCCD1}">
+              <a14:hiddenFill xmlns:a14="http://schemas.microsoft.com/office/drawing/2010/main">
+                <a:solidFill>
+                  <a:srgbClr val="FFFFFF"/>
+                </a:solidFill>
+              </a14:hiddenFill>
+            </a:ext>
+          </a:extLst>
+        </p:spPr>
+      </p:pic>
+      <p:sp>
+        <p:nvSpPr>
+          <p:cNvPr id="49" name="Arrow: Left 48">
+            <a:extLst>
+              <a:ext uri="{FF2B5EF4-FFF2-40B4-BE49-F238E27FC236}">
+                <a16:creationId xmlns:a16="http://schemas.microsoft.com/office/drawing/2014/main" id="{5A56997F-7AC2-47CC-969E-4857F13073ED}"/>
+              </a:ext>
+            </a:extLst>
+          </p:cNvPr>
+          <p:cNvSpPr/>
+          <p:nvPr/>
+        </p:nvSpPr>
+        <p:spPr>
+          <a:xfrm>
+            <a:off x="7523813" y="6202222"/>
+            <a:ext cx="1481673" cy="536373"/>
+          </a:xfrm>
+          <a:prstGeom prst="leftArrow">
+            <a:avLst/>
+          </a:prstGeom>
+          <a:solidFill>
+            <a:srgbClr val="002060"/>
+          </a:solidFill>
+        </p:spPr>
+        <p:style>
+          <a:lnRef idx="2">
+            <a:schemeClr val="accent1">
+              <a:shade val="50000"/>
+            </a:schemeClr>
+          </a:lnRef>
+          <a:fillRef idx="1">
+            <a:schemeClr val="accent1"/>
+          </a:fillRef>
+          <a:effectRef idx="0">
+            <a:schemeClr val="accent1"/>
+          </a:effectRef>
+          <a:fontRef idx="minor">
+            <a:schemeClr val="lt1"/>
+          </a:fontRef>
+        </p:style>
+        <p:txBody>
+          <a:bodyPr rtlCol="0" anchor="ctr"/>
+          <a:lstStyle/>
+          <a:p>
+            <a:pPr algn="ctr"/>
+            <a:r>
+              <a:rPr lang="en-US" sz="1200" dirty="0"/>
+              <a:t>Ongoing query</a:t>
+            </a:r>
+            <a:endParaRPr lang="en-GB" sz="1200" dirty="0"/>
+          </a:p>
+        </p:txBody>
+      </p:sp>
+      <p:sp>
+        <p:nvSpPr>
+          <p:cNvPr id="55" name="Arrow: Left-Right 54">
+            <a:extLst>
+              <a:ext uri="{FF2B5EF4-FFF2-40B4-BE49-F238E27FC236}">
+                <a16:creationId xmlns:a16="http://schemas.microsoft.com/office/drawing/2014/main" id="{259DC383-2E0B-437C-8921-FE18CF693B92}"/>
+              </a:ext>
+            </a:extLst>
+          </p:cNvPr>
+          <p:cNvSpPr/>
+          <p:nvPr/>
+        </p:nvSpPr>
+        <p:spPr>
+          <a:xfrm>
+            <a:off x="9025764" y="6120750"/>
+            <a:ext cx="1228274" cy="651609"/>
+          </a:xfrm>
+          <a:prstGeom prst="leftRightArrow">
+            <a:avLst/>
+          </a:prstGeom>
+          <a:noFill/>
+          <a:ln w="28575">
+            <a:prstDash val="sysDash"/>
+          </a:ln>
+        </p:spPr>
+        <p:style>
+          <a:lnRef idx="2">
+            <a:schemeClr val="accent1">
+              <a:shade val="50000"/>
+            </a:schemeClr>
+          </a:lnRef>
+          <a:fillRef idx="1">
+            <a:schemeClr val="accent1"/>
+          </a:fillRef>
+          <a:effectRef idx="0">
+            <a:schemeClr val="accent1"/>
+          </a:effectRef>
+          <a:fontRef idx="minor">
+            <a:schemeClr val="lt1"/>
+          </a:fontRef>
+        </p:style>
+        <p:txBody>
+          <a:bodyPr rtlCol="0" anchor="ctr"/>
+          <a:lstStyle/>
+          <a:p>
+            <a:pPr algn="ctr"/>
+            <a:r>
+              <a:rPr lang="en-US" sz="800" dirty="0">
+                <a:solidFill>
+                  <a:sysClr val="windowText" lastClr="000000"/>
+                </a:solidFill>
+              </a:rPr>
+              <a:t>Check presence of RPA Thread</a:t>
+            </a:r>
+            <a:endParaRPr lang="en-GB" sz="800" dirty="0">
+              <a:solidFill>
+                <a:sysClr val="windowText" lastClr="000000"/>
+              </a:solidFill>
+            </a:endParaRPr>
+          </a:p>
+        </p:txBody>
+      </p:sp>
+      <p:sp>
+        <p:nvSpPr>
+          <p:cNvPr id="56" name="TextBox 55">
+            <a:extLst>
+              <a:ext uri="{FF2B5EF4-FFF2-40B4-BE49-F238E27FC236}">
+                <a16:creationId xmlns:a16="http://schemas.microsoft.com/office/drawing/2014/main" id="{C2BAF97D-30BA-4029-B334-24A6EAFD18B0}"/>
+              </a:ext>
+            </a:extLst>
+          </p:cNvPr>
+          <p:cNvSpPr txBox="1"/>
+          <p:nvPr/>
+        </p:nvSpPr>
+        <p:spPr>
+          <a:xfrm>
+            <a:off x="7302164" y="5951161"/>
+            <a:ext cx="1501951" cy="261610"/>
+          </a:xfrm>
+          <a:prstGeom prst="rect">
+            <a:avLst/>
+          </a:prstGeom>
+          <a:solidFill>
+            <a:schemeClr val="accent4">
+              <a:lumMod val="20000"/>
+              <a:lumOff val="80000"/>
+            </a:schemeClr>
+          </a:solidFill>
+          <a:ln>
+            <a:solidFill>
+              <a:schemeClr val="tx1"/>
+            </a:solidFill>
+          </a:ln>
+          <a:effectLst>
+            <a:outerShdw blurRad="50800" dist="38100" dir="2700000" algn="tl" rotWithShape="0">
+              <a:prstClr val="black">
+                <a:alpha val="40000"/>
+              </a:prstClr>
+            </a:outerShdw>
+          </a:effectLst>
+        </p:spPr>
+        <p:txBody>
+          <a:bodyPr wrap="square" rtlCol="0">
+            <a:spAutoFit/>
+          </a:bodyPr>
+          <a:lstStyle/>
+          <a:p>
+            <a:pPr algn="ctr"/>
+            <a:r>
+              <a:rPr lang="en-US" sz="1100" dirty="0"/>
+              <a:t>Welcome Intent</a:t>
+            </a:r>
+            <a:endParaRPr lang="en-GB" sz="1100" dirty="0"/>
+          </a:p>
+        </p:txBody>
+      </p:sp>
       <p:sp>
         <p:nvSpPr>
           <p:cNvPr id="15" name="Arrow: Right 14">
@@ -10897,1003 +11894,6 @@
               <a:t>Add to Book List</a:t>
             </a:r>
             <a:endParaRPr lang="en-GB" sz="1200" dirty="0"/>
-          </a:p>
-        </p:txBody>
-      </p:sp>
-      <p:pic>
-        <p:nvPicPr>
-          <p:cNvPr id="21" name="Picture 20">
-            <a:extLst>
-              <a:ext uri="{FF2B5EF4-FFF2-40B4-BE49-F238E27FC236}">
-                <a16:creationId xmlns:a16="http://schemas.microsoft.com/office/drawing/2014/main" id="{FBDBF0E6-7A69-44FD-A398-6AB0FF618B4C}"/>
-              </a:ext>
-            </a:extLst>
-          </p:cNvPr>
-          <p:cNvPicPr>
-            <a:picLocks noChangeAspect="1"/>
-          </p:cNvPicPr>
-          <p:nvPr/>
-        </p:nvPicPr>
-        <p:blipFill rotWithShape="1">
-          <a:blip r:embed="rId8" cstate="print">
-            <a:extLst>
-              <a:ext uri="{28A0092B-C50C-407E-A947-70E740481C1C}">
-                <a14:useLocalDpi xmlns:a14="http://schemas.microsoft.com/office/drawing/2010/main" val="0"/>
-              </a:ext>
-            </a:extLst>
-          </a:blip>
-          <a:srcRect t="55444" b="23031"/>
-          <a:stretch/>
-        </p:blipFill>
-        <p:spPr bwMode="auto">
-          <a:xfrm>
-            <a:off x="3016692" y="3167099"/>
-            <a:ext cx="2286000" cy="1066238"/>
-          </a:xfrm>
-          <a:prstGeom prst="rect">
-            <a:avLst/>
-          </a:prstGeom>
-          <a:noFill/>
-          <a:ln>
-            <a:noFill/>
-          </a:ln>
-          <a:effectLst>
-            <a:outerShdw blurRad="50800" dist="38100" dir="2700000" algn="tl" rotWithShape="0">
-              <a:prstClr val="black">
-                <a:alpha val="40000"/>
-              </a:prstClr>
-            </a:outerShdw>
-          </a:effectLst>
-        </p:spPr>
-      </p:pic>
-      <p:sp>
-        <p:nvSpPr>
-          <p:cNvPr id="26" name="Arrow: Right 25">
-            <a:extLst>
-              <a:ext uri="{FF2B5EF4-FFF2-40B4-BE49-F238E27FC236}">
-                <a16:creationId xmlns:a16="http://schemas.microsoft.com/office/drawing/2014/main" id="{ACAF8BE2-7213-4FD6-B3DD-A4F2AD434C3A}"/>
-              </a:ext>
-            </a:extLst>
-          </p:cNvPr>
-          <p:cNvSpPr/>
-          <p:nvPr/>
-        </p:nvSpPr>
-        <p:spPr>
-          <a:xfrm rot="5400000" flipV="1">
-            <a:off x="4552881" y="2807188"/>
-            <a:ext cx="549983" cy="536373"/>
-          </a:xfrm>
-          <a:prstGeom prst="rightArrow">
-            <a:avLst/>
-          </a:prstGeom>
-          <a:solidFill>
-            <a:srgbClr val="002060"/>
-          </a:solidFill>
-          <a:effectLst>
-            <a:outerShdw blurRad="50800" dist="38100" dir="2700000" algn="tl" rotWithShape="0">
-              <a:prstClr val="black">
-                <a:alpha val="40000"/>
-              </a:prstClr>
-            </a:outerShdw>
-          </a:effectLst>
-        </p:spPr>
-        <p:style>
-          <a:lnRef idx="2">
-            <a:schemeClr val="accent1">
-              <a:shade val="50000"/>
-            </a:schemeClr>
-          </a:lnRef>
-          <a:fillRef idx="1">
-            <a:schemeClr val="accent1"/>
-          </a:fillRef>
-          <a:effectRef idx="0">
-            <a:schemeClr val="accent1"/>
-          </a:effectRef>
-          <a:fontRef idx="minor">
-            <a:schemeClr val="lt1"/>
-          </a:fontRef>
-        </p:style>
-        <p:txBody>
-          <a:bodyPr rtlCol="0" anchor="ctr"/>
-          <a:lstStyle/>
-          <a:p>
-            <a:pPr algn="ctr"/>
-            <a:r>
-              <a:rPr lang="en-US" sz="1200" dirty="0"/>
-              <a:t>No</a:t>
-            </a:r>
-            <a:endParaRPr lang="en-GB" sz="1200" dirty="0"/>
-          </a:p>
-        </p:txBody>
-      </p:sp>
-      <p:sp>
-        <p:nvSpPr>
-          <p:cNvPr id="27" name="TextBox 26">
-            <a:extLst>
-              <a:ext uri="{FF2B5EF4-FFF2-40B4-BE49-F238E27FC236}">
-                <a16:creationId xmlns:a16="http://schemas.microsoft.com/office/drawing/2014/main" id="{9B228543-F979-4591-88EF-91AC725D2762}"/>
-              </a:ext>
-            </a:extLst>
-          </p:cNvPr>
-          <p:cNvSpPr txBox="1"/>
-          <p:nvPr/>
-        </p:nvSpPr>
-        <p:spPr>
-          <a:xfrm>
-            <a:off x="4009394" y="4076409"/>
-            <a:ext cx="995530" cy="261610"/>
-          </a:xfrm>
-          <a:prstGeom prst="rect">
-            <a:avLst/>
-          </a:prstGeom>
-          <a:solidFill>
-            <a:schemeClr val="accent4">
-              <a:lumMod val="40000"/>
-              <a:lumOff val="60000"/>
-            </a:schemeClr>
-          </a:solidFill>
-          <a:ln>
-            <a:solidFill>
-              <a:schemeClr val="tx1"/>
-            </a:solidFill>
-          </a:ln>
-          <a:effectLst>
-            <a:outerShdw blurRad="50800" dist="38100" dir="2700000" algn="tl" rotWithShape="0">
-              <a:prstClr val="black">
-                <a:alpha val="40000"/>
-              </a:prstClr>
-            </a:outerShdw>
-          </a:effectLst>
-        </p:spPr>
-        <p:txBody>
-          <a:bodyPr wrap="square" rtlCol="0">
-            <a:spAutoFit/>
-          </a:bodyPr>
-          <a:lstStyle/>
-          <a:p>
-            <a:pPr algn="ctr"/>
-            <a:r>
-              <a:rPr lang="en-US" sz="1100" dirty="0"/>
-              <a:t>Reset Context</a:t>
-            </a:r>
-          </a:p>
-        </p:txBody>
-      </p:sp>
-      <p:sp>
-        <p:nvSpPr>
-          <p:cNvPr id="29" name="Arrow: Right 28">
-            <a:extLst>
-              <a:ext uri="{FF2B5EF4-FFF2-40B4-BE49-F238E27FC236}">
-                <a16:creationId xmlns:a16="http://schemas.microsoft.com/office/drawing/2014/main" id="{F2F2444D-B929-4904-A454-339CEBB4F431}"/>
-              </a:ext>
-            </a:extLst>
-          </p:cNvPr>
-          <p:cNvSpPr/>
-          <p:nvPr/>
-        </p:nvSpPr>
-        <p:spPr>
-          <a:xfrm>
-            <a:off x="7821318" y="3007707"/>
-            <a:ext cx="1367855" cy="536373"/>
-          </a:xfrm>
-          <a:prstGeom prst="rightArrow">
-            <a:avLst/>
-          </a:prstGeom>
-          <a:solidFill>
-            <a:srgbClr val="002060"/>
-          </a:solidFill>
-          <a:effectLst>
-            <a:outerShdw blurRad="50800" dist="38100" dir="2700000" algn="tl" rotWithShape="0">
-              <a:prstClr val="black">
-                <a:alpha val="40000"/>
-              </a:prstClr>
-            </a:outerShdw>
-          </a:effectLst>
-        </p:spPr>
-        <p:style>
-          <a:lnRef idx="2">
-            <a:schemeClr val="accent1">
-              <a:shade val="50000"/>
-            </a:schemeClr>
-          </a:lnRef>
-          <a:fillRef idx="1">
-            <a:schemeClr val="accent1"/>
-          </a:fillRef>
-          <a:effectRef idx="0">
-            <a:schemeClr val="accent1"/>
-          </a:effectRef>
-          <a:fontRef idx="minor">
-            <a:schemeClr val="lt1"/>
-          </a:fontRef>
-        </p:style>
-        <p:txBody>
-          <a:bodyPr rtlCol="0" anchor="ctr"/>
-          <a:lstStyle/>
-          <a:p>
-            <a:pPr algn="ctr"/>
-            <a:r>
-              <a:rPr lang="en-US" sz="1200" dirty="0"/>
-              <a:t>Add to Book List</a:t>
-            </a:r>
-            <a:endParaRPr lang="en-GB" sz="1200" dirty="0"/>
-          </a:p>
-        </p:txBody>
-      </p:sp>
-      <p:sp>
-        <p:nvSpPr>
-          <p:cNvPr id="30" name="Arrow: Right 29">
-            <a:extLst>
-              <a:ext uri="{FF2B5EF4-FFF2-40B4-BE49-F238E27FC236}">
-                <a16:creationId xmlns:a16="http://schemas.microsoft.com/office/drawing/2014/main" id="{93ABB3EE-02BF-496E-98D1-8B9DBF5B60FB}"/>
-              </a:ext>
-            </a:extLst>
-          </p:cNvPr>
-          <p:cNvSpPr/>
-          <p:nvPr/>
-        </p:nvSpPr>
-        <p:spPr>
-          <a:xfrm rot="10800000" flipV="1">
-            <a:off x="5011287" y="3637590"/>
-            <a:ext cx="685390" cy="536373"/>
-          </a:xfrm>
-          <a:prstGeom prst="rightArrow">
-            <a:avLst/>
-          </a:prstGeom>
-          <a:solidFill>
-            <a:srgbClr val="002060"/>
-          </a:solidFill>
-          <a:effectLst>
-            <a:outerShdw blurRad="50800" dist="38100" dir="2700000" algn="tl" rotWithShape="0">
-              <a:prstClr val="black">
-                <a:alpha val="40000"/>
-              </a:prstClr>
-            </a:outerShdw>
-          </a:effectLst>
-        </p:spPr>
-        <p:style>
-          <a:lnRef idx="2">
-            <a:schemeClr val="accent1">
-              <a:shade val="50000"/>
-            </a:schemeClr>
-          </a:lnRef>
-          <a:fillRef idx="1">
-            <a:schemeClr val="accent1"/>
-          </a:fillRef>
-          <a:effectRef idx="0">
-            <a:schemeClr val="accent1"/>
-          </a:effectRef>
-          <a:fontRef idx="minor">
-            <a:schemeClr val="lt1"/>
-          </a:fontRef>
-        </p:style>
-        <p:txBody>
-          <a:bodyPr rtlCol="0" anchor="ctr"/>
-          <a:lstStyle/>
-          <a:p>
-            <a:pPr algn="ctr"/>
-            <a:r>
-              <a:rPr lang="en-US" sz="1200" dirty="0"/>
-              <a:t>No</a:t>
-            </a:r>
-            <a:endParaRPr lang="en-GB" sz="1200" dirty="0"/>
-          </a:p>
-        </p:txBody>
-      </p:sp>
-      <p:pic>
-        <p:nvPicPr>
-          <p:cNvPr id="31" name="Picture 30">
-            <a:extLst>
-              <a:ext uri="{FF2B5EF4-FFF2-40B4-BE49-F238E27FC236}">
-                <a16:creationId xmlns:a16="http://schemas.microsoft.com/office/drawing/2014/main" id="{A3CB3C79-D0E6-4EB6-BD84-637BA8583EEA}"/>
-              </a:ext>
-            </a:extLst>
-          </p:cNvPr>
-          <p:cNvPicPr>
-            <a:picLocks noChangeAspect="1"/>
-          </p:cNvPicPr>
-          <p:nvPr/>
-        </p:nvPicPr>
-        <p:blipFill rotWithShape="1">
-          <a:blip r:embed="rId3" cstate="print">
-            <a:extLst>
-              <a:ext uri="{28A0092B-C50C-407E-A947-70E740481C1C}">
-                <a14:useLocalDpi xmlns:a14="http://schemas.microsoft.com/office/drawing/2010/main" val="0"/>
-              </a:ext>
-            </a:extLst>
-          </a:blip>
-          <a:srcRect t="54379" b="22010"/>
-          <a:stretch/>
-        </p:blipFill>
-        <p:spPr bwMode="auto">
-          <a:xfrm>
-            <a:off x="5580182" y="4385554"/>
-            <a:ext cx="2286000" cy="1169956"/>
-          </a:xfrm>
-          <a:prstGeom prst="rect">
-            <a:avLst/>
-          </a:prstGeom>
-          <a:noFill/>
-          <a:ln>
-            <a:noFill/>
-          </a:ln>
-          <a:effectLst>
-            <a:outerShdw blurRad="50800" dist="38100" dir="2700000" algn="tl" rotWithShape="0">
-              <a:prstClr val="black">
-                <a:alpha val="40000"/>
-              </a:prstClr>
-            </a:outerShdw>
-          </a:effectLst>
-        </p:spPr>
-      </p:pic>
-      <p:sp>
-        <p:nvSpPr>
-          <p:cNvPr id="32" name="TextBox 31">
-            <a:extLst>
-              <a:ext uri="{FF2B5EF4-FFF2-40B4-BE49-F238E27FC236}">
-                <a16:creationId xmlns:a16="http://schemas.microsoft.com/office/drawing/2014/main" id="{F7899094-ECCA-4982-983D-DF2444E4C4DA}"/>
-              </a:ext>
-            </a:extLst>
-          </p:cNvPr>
-          <p:cNvSpPr txBox="1"/>
-          <p:nvPr/>
-        </p:nvSpPr>
-        <p:spPr>
-          <a:xfrm>
-            <a:off x="7104418" y="5324351"/>
-            <a:ext cx="995530" cy="261610"/>
-          </a:xfrm>
-          <a:prstGeom prst="rect">
-            <a:avLst/>
-          </a:prstGeom>
-          <a:solidFill>
-            <a:schemeClr val="accent4">
-              <a:lumMod val="40000"/>
-              <a:lumOff val="60000"/>
-            </a:schemeClr>
-          </a:solidFill>
-          <a:ln>
-            <a:solidFill>
-              <a:schemeClr val="tx1"/>
-            </a:solidFill>
-          </a:ln>
-          <a:effectLst>
-            <a:outerShdw blurRad="50800" dist="38100" dir="2700000" algn="tl" rotWithShape="0">
-              <a:prstClr val="black">
-                <a:alpha val="40000"/>
-              </a:prstClr>
-            </a:outerShdw>
-          </a:effectLst>
-        </p:spPr>
-        <p:txBody>
-          <a:bodyPr wrap="square" rtlCol="0">
-            <a:spAutoFit/>
-          </a:bodyPr>
-          <a:lstStyle/>
-          <a:p>
-            <a:pPr algn="ctr"/>
-            <a:r>
-              <a:rPr lang="en-US" sz="1100" dirty="0"/>
-              <a:t>Reset Context</a:t>
-            </a:r>
-          </a:p>
-        </p:txBody>
-      </p:sp>
-      <p:sp>
-        <p:nvSpPr>
-          <p:cNvPr id="33" name="Arrow: Right 32">
-            <a:extLst>
-              <a:ext uri="{FF2B5EF4-FFF2-40B4-BE49-F238E27FC236}">
-                <a16:creationId xmlns:a16="http://schemas.microsoft.com/office/drawing/2014/main" id="{D8390B4D-897A-4201-9DC5-602FE5057D00}"/>
-              </a:ext>
-            </a:extLst>
-          </p:cNvPr>
-          <p:cNvSpPr/>
-          <p:nvPr/>
-        </p:nvSpPr>
-        <p:spPr>
-          <a:xfrm rot="5400000" flipV="1">
-            <a:off x="6255263" y="4144474"/>
-            <a:ext cx="536373" cy="536373"/>
-          </a:xfrm>
-          <a:prstGeom prst="rightArrow">
-            <a:avLst/>
-          </a:prstGeom>
-          <a:solidFill>
-            <a:srgbClr val="002060"/>
-          </a:solidFill>
-          <a:effectLst>
-            <a:outerShdw blurRad="50800" dist="38100" dir="2700000" algn="tl" rotWithShape="0">
-              <a:prstClr val="black">
-                <a:alpha val="40000"/>
-              </a:prstClr>
-            </a:outerShdw>
-          </a:effectLst>
-        </p:spPr>
-        <p:style>
-          <a:lnRef idx="2">
-            <a:schemeClr val="accent1">
-              <a:shade val="50000"/>
-            </a:schemeClr>
-          </a:lnRef>
-          <a:fillRef idx="1">
-            <a:schemeClr val="accent1"/>
-          </a:fillRef>
-          <a:effectRef idx="0">
-            <a:schemeClr val="accent1"/>
-          </a:effectRef>
-          <a:fontRef idx="minor">
-            <a:schemeClr val="lt1"/>
-          </a:fontRef>
-        </p:style>
-        <p:txBody>
-          <a:bodyPr rtlCol="0" anchor="ctr"/>
-          <a:lstStyle/>
-          <a:p>
-            <a:pPr algn="ctr"/>
-            <a:r>
-              <a:rPr lang="en-US" sz="1200" dirty="0"/>
-              <a:t>Yes</a:t>
-            </a:r>
-            <a:endParaRPr lang="en-GB" sz="1200" dirty="0"/>
-          </a:p>
-        </p:txBody>
-      </p:sp>
-      <p:sp>
-        <p:nvSpPr>
-          <p:cNvPr id="34" name="TextBox 33">
-            <a:extLst>
-              <a:ext uri="{FF2B5EF4-FFF2-40B4-BE49-F238E27FC236}">
-                <a16:creationId xmlns:a16="http://schemas.microsoft.com/office/drawing/2014/main" id="{20752D73-CB18-44E9-98C1-4E5F8FACA9BF}"/>
-              </a:ext>
-            </a:extLst>
-          </p:cNvPr>
-          <p:cNvSpPr txBox="1"/>
-          <p:nvPr/>
-        </p:nvSpPr>
-        <p:spPr>
-          <a:xfrm>
-            <a:off x="7523813" y="3567080"/>
-            <a:ext cx="1501951" cy="600164"/>
-          </a:xfrm>
-          <a:prstGeom prst="rect">
-            <a:avLst/>
-          </a:prstGeom>
-          <a:solidFill>
-            <a:schemeClr val="accent5">
-              <a:lumMod val="20000"/>
-              <a:lumOff val="80000"/>
-            </a:schemeClr>
-          </a:solidFill>
-          <a:ln>
-            <a:solidFill>
-              <a:schemeClr val="tx1"/>
-            </a:solidFill>
-          </a:ln>
-          <a:effectLst>
-            <a:outerShdw blurRad="50800" dist="38100" dir="2700000" algn="tl" rotWithShape="0">
-              <a:prstClr val="black">
-                <a:alpha val="40000"/>
-              </a:prstClr>
-            </a:outerShdw>
-          </a:effectLst>
-        </p:spPr>
-        <p:txBody>
-          <a:bodyPr wrap="square" rtlCol="0">
-            <a:spAutoFit/>
-          </a:bodyPr>
-          <a:lstStyle/>
-          <a:p>
-            <a:pPr algn="ctr"/>
-            <a:r>
-              <a:rPr lang="en-US" sz="1100" dirty="0"/>
-              <a:t>Set Output Context: </a:t>
-            </a:r>
-          </a:p>
-          <a:p>
-            <a:pPr algn="ctr"/>
-            <a:r>
-              <a:rPr lang="en-US" sz="1100" dirty="0"/>
-              <a:t>Follow up context – yes, no</a:t>
-            </a:r>
-            <a:endParaRPr lang="en-GB" sz="1100" dirty="0"/>
-          </a:p>
-        </p:txBody>
-      </p:sp>
-      <p:sp>
-        <p:nvSpPr>
-          <p:cNvPr id="35" name="Arrow: Right 34">
-            <a:extLst>
-              <a:ext uri="{FF2B5EF4-FFF2-40B4-BE49-F238E27FC236}">
-                <a16:creationId xmlns:a16="http://schemas.microsoft.com/office/drawing/2014/main" id="{EBF46B02-B016-4F27-A97E-7324AB1472EB}"/>
-              </a:ext>
-            </a:extLst>
-          </p:cNvPr>
-          <p:cNvSpPr/>
-          <p:nvPr/>
-        </p:nvSpPr>
-        <p:spPr>
-          <a:xfrm rot="5400000" flipV="1">
-            <a:off x="5638145" y="2803858"/>
-            <a:ext cx="549984" cy="536373"/>
-          </a:xfrm>
-          <a:prstGeom prst="rightArrow">
-            <a:avLst/>
-          </a:prstGeom>
-          <a:solidFill>
-            <a:srgbClr val="002060"/>
-          </a:solidFill>
-          <a:effectLst>
-            <a:outerShdw blurRad="50800" dist="38100" dir="2700000" algn="tl" rotWithShape="0">
-              <a:prstClr val="black">
-                <a:alpha val="40000"/>
-              </a:prstClr>
-            </a:outerShdw>
-          </a:effectLst>
-        </p:spPr>
-        <p:style>
-          <a:lnRef idx="2">
-            <a:schemeClr val="accent1">
-              <a:shade val="50000"/>
-            </a:schemeClr>
-          </a:lnRef>
-          <a:fillRef idx="1">
-            <a:schemeClr val="accent1"/>
-          </a:fillRef>
-          <a:effectRef idx="0">
-            <a:schemeClr val="accent1"/>
-          </a:effectRef>
-          <a:fontRef idx="minor">
-            <a:schemeClr val="lt1"/>
-          </a:fontRef>
-        </p:style>
-        <p:txBody>
-          <a:bodyPr rtlCol="0" anchor="ctr"/>
-          <a:lstStyle/>
-          <a:p>
-            <a:pPr algn="ctr"/>
-            <a:r>
-              <a:rPr lang="en-US" sz="1200" dirty="0"/>
-              <a:t>Yes</a:t>
-            </a:r>
-            <a:endParaRPr lang="en-GB" sz="1200" dirty="0"/>
-          </a:p>
-        </p:txBody>
-      </p:sp>
-      <p:sp>
-        <p:nvSpPr>
-          <p:cNvPr id="37" name="TextBox 36">
-            <a:extLst>
-              <a:ext uri="{FF2B5EF4-FFF2-40B4-BE49-F238E27FC236}">
-                <a16:creationId xmlns:a16="http://schemas.microsoft.com/office/drawing/2014/main" id="{25815E41-4245-4666-B130-583D59D97CD2}"/>
-              </a:ext>
-            </a:extLst>
-          </p:cNvPr>
-          <p:cNvSpPr txBox="1"/>
-          <p:nvPr/>
-        </p:nvSpPr>
-        <p:spPr>
-          <a:xfrm>
-            <a:off x="7887225" y="4719634"/>
-            <a:ext cx="995530" cy="261610"/>
-          </a:xfrm>
-          <a:prstGeom prst="rect">
-            <a:avLst/>
-          </a:prstGeom>
-          <a:solidFill>
-            <a:schemeClr val="accent6">
-              <a:lumMod val="60000"/>
-              <a:lumOff val="40000"/>
-            </a:schemeClr>
-          </a:solidFill>
-          <a:ln>
-            <a:solidFill>
-              <a:schemeClr val="tx1"/>
-            </a:solidFill>
-          </a:ln>
-          <a:effectLst>
-            <a:outerShdw blurRad="50800" dist="38100" dir="2700000" algn="tl" rotWithShape="0">
-              <a:prstClr val="black">
-                <a:alpha val="40000"/>
-              </a:prstClr>
-            </a:outerShdw>
-          </a:effectLst>
-        </p:spPr>
-        <p:txBody>
-          <a:bodyPr wrap="square" rtlCol="0">
-            <a:spAutoFit/>
-          </a:bodyPr>
-          <a:lstStyle/>
-          <a:p>
-            <a:pPr algn="ctr"/>
-            <a:r>
-              <a:rPr lang="en-US" sz="1100" dirty="0"/>
-              <a:t>Book List Full</a:t>
-            </a:r>
-          </a:p>
-        </p:txBody>
-      </p:sp>
-      <p:sp>
-        <p:nvSpPr>
-          <p:cNvPr id="38" name="Arrow: Right 37">
-            <a:extLst>
-              <a:ext uri="{FF2B5EF4-FFF2-40B4-BE49-F238E27FC236}">
-                <a16:creationId xmlns:a16="http://schemas.microsoft.com/office/drawing/2014/main" id="{4B91CFD3-F33A-486D-9D60-A28F6ADDCC6B}"/>
-              </a:ext>
-            </a:extLst>
-          </p:cNvPr>
-          <p:cNvSpPr/>
-          <p:nvPr/>
-        </p:nvSpPr>
-        <p:spPr>
-          <a:xfrm>
-            <a:off x="7821318" y="4302726"/>
-            <a:ext cx="1367855" cy="536373"/>
-          </a:xfrm>
-          <a:prstGeom prst="rightArrow">
-            <a:avLst/>
-          </a:prstGeom>
-          <a:solidFill>
-            <a:srgbClr val="002060"/>
-          </a:solidFill>
-          <a:effectLst>
-            <a:outerShdw blurRad="50800" dist="38100" dir="2700000" algn="tl" rotWithShape="0">
-              <a:prstClr val="black">
-                <a:alpha val="40000"/>
-              </a:prstClr>
-            </a:outerShdw>
-          </a:effectLst>
-        </p:spPr>
-        <p:style>
-          <a:lnRef idx="2">
-            <a:schemeClr val="accent1">
-              <a:shade val="50000"/>
-            </a:schemeClr>
-          </a:lnRef>
-          <a:fillRef idx="1">
-            <a:schemeClr val="accent1"/>
-          </a:fillRef>
-          <a:effectRef idx="0">
-            <a:schemeClr val="accent1"/>
-          </a:effectRef>
-          <a:fontRef idx="minor">
-            <a:schemeClr val="lt1"/>
-          </a:fontRef>
-        </p:style>
-        <p:txBody>
-          <a:bodyPr rtlCol="0" anchor="ctr"/>
-          <a:lstStyle/>
-          <a:p>
-            <a:pPr algn="ctr"/>
-            <a:r>
-              <a:rPr lang="en-US" sz="1200" dirty="0"/>
-              <a:t>Add to Book List</a:t>
-            </a:r>
-            <a:endParaRPr lang="en-GB" sz="1200" dirty="0"/>
-          </a:p>
-        </p:txBody>
-      </p:sp>
-      <p:sp>
-        <p:nvSpPr>
-          <p:cNvPr id="45" name="Arrow: Right 44">
-            <a:extLst>
-              <a:ext uri="{FF2B5EF4-FFF2-40B4-BE49-F238E27FC236}">
-                <a16:creationId xmlns:a16="http://schemas.microsoft.com/office/drawing/2014/main" id="{57C5FF74-CC8D-4A60-BD69-96FE1E07CB02}"/>
-              </a:ext>
-            </a:extLst>
-          </p:cNvPr>
-          <p:cNvSpPr/>
-          <p:nvPr/>
-        </p:nvSpPr>
-        <p:spPr>
-          <a:xfrm>
-            <a:off x="9153632" y="5253751"/>
-            <a:ext cx="1146934" cy="778152"/>
-          </a:xfrm>
-          <a:prstGeom prst="rightArrow">
-            <a:avLst/>
-          </a:prstGeom>
-          <a:noFill/>
-          <a:ln w="28575">
-            <a:prstDash val="sysDash"/>
-          </a:ln>
-        </p:spPr>
-        <p:style>
-          <a:lnRef idx="2">
-            <a:schemeClr val="accent1">
-              <a:shade val="50000"/>
-            </a:schemeClr>
-          </a:lnRef>
-          <a:fillRef idx="1">
-            <a:schemeClr val="accent1"/>
-          </a:fillRef>
-          <a:effectRef idx="0">
-            <a:schemeClr val="accent1"/>
-          </a:effectRef>
-          <a:fontRef idx="minor">
-            <a:schemeClr val="lt1"/>
-          </a:fontRef>
-        </p:style>
-        <p:txBody>
-          <a:bodyPr rtlCol="0" anchor="ctr"/>
-          <a:lstStyle/>
-          <a:p>
-            <a:pPr algn="ctr"/>
-            <a:r>
-              <a:rPr lang="en-US" sz="1200" dirty="0">
-                <a:solidFill>
-                  <a:sysClr val="windowText" lastClr="000000"/>
-                </a:solidFill>
-              </a:rPr>
-              <a:t>Triggers RPA Thread</a:t>
-            </a:r>
-            <a:endParaRPr lang="en-GB" sz="1200" dirty="0">
-              <a:solidFill>
-                <a:sysClr val="windowText" lastClr="000000"/>
-              </a:solidFill>
-            </a:endParaRPr>
-          </a:p>
-        </p:txBody>
-      </p:sp>
-      <p:pic>
-        <p:nvPicPr>
-          <p:cNvPr id="2052" name="Picture 4" descr="Installing Python 3 and Flask on GoDaddy | by Jordan Ireland | Towards Data  Science">
-            <a:extLst>
-              <a:ext uri="{FF2B5EF4-FFF2-40B4-BE49-F238E27FC236}">
-                <a16:creationId xmlns:a16="http://schemas.microsoft.com/office/drawing/2014/main" id="{E7B51BE6-C414-4D90-B1A9-59C0B0B78DFD}"/>
-              </a:ext>
-            </a:extLst>
-          </p:cNvPr>
-          <p:cNvPicPr>
-            <a:picLocks noChangeAspect="1" noChangeArrowheads="1"/>
-          </p:cNvPicPr>
-          <p:nvPr/>
-        </p:nvPicPr>
-        <p:blipFill>
-          <a:blip r:embed="rId9">
-            <a:extLst>
-              <a:ext uri="{28A0092B-C50C-407E-A947-70E740481C1C}">
-                <a14:useLocalDpi xmlns:a14="http://schemas.microsoft.com/office/drawing/2010/main" val="0"/>
-              </a:ext>
-            </a:extLst>
-          </a:blip>
-          <a:srcRect/>
-          <a:stretch>
-            <a:fillRect/>
-          </a:stretch>
-        </p:blipFill>
-        <p:spPr bwMode="auto">
-          <a:xfrm>
-            <a:off x="9116521" y="24656"/>
-            <a:ext cx="899277" cy="562048"/>
-          </a:xfrm>
-          <a:prstGeom prst="rect">
-            <a:avLst/>
-          </a:prstGeom>
-          <a:noFill/>
-          <a:extLst>
-            <a:ext uri="{909E8E84-426E-40DD-AFC4-6F175D3DCCD1}">
-              <a14:hiddenFill xmlns:a14="http://schemas.microsoft.com/office/drawing/2010/main">
-                <a:solidFill>
-                  <a:srgbClr val="FFFFFF"/>
-                </a:solidFill>
-              </a14:hiddenFill>
-            </a:ext>
-          </a:extLst>
-        </p:spPr>
-      </p:pic>
-      <p:pic>
-        <p:nvPicPr>
-          <p:cNvPr id="2054" name="Picture 6" descr="Release 6.14.0">
-            <a:extLst>
-              <a:ext uri="{FF2B5EF4-FFF2-40B4-BE49-F238E27FC236}">
-                <a16:creationId xmlns:a16="http://schemas.microsoft.com/office/drawing/2014/main" id="{25E97357-572E-4F6B-B05A-EBD92BEAD89F}"/>
-              </a:ext>
-            </a:extLst>
-          </p:cNvPr>
-          <p:cNvPicPr>
-            <a:picLocks noChangeAspect="1" noChangeArrowheads="1"/>
-          </p:cNvPicPr>
-          <p:nvPr/>
-        </p:nvPicPr>
-        <p:blipFill>
-          <a:blip r:embed="rId10">
-            <a:extLst>
-              <a:ext uri="{28A0092B-C50C-407E-A947-70E740481C1C}">
-                <a14:useLocalDpi xmlns:a14="http://schemas.microsoft.com/office/drawing/2010/main" val="0"/>
-              </a:ext>
-            </a:extLst>
-          </a:blip>
-          <a:srcRect/>
-          <a:stretch>
-            <a:fillRect/>
-          </a:stretch>
-        </p:blipFill>
-        <p:spPr bwMode="auto">
-          <a:xfrm>
-            <a:off x="10263217" y="4837170"/>
-            <a:ext cx="982211" cy="360056"/>
-          </a:xfrm>
-          <a:prstGeom prst="rect">
-            <a:avLst/>
-          </a:prstGeom>
-          <a:noFill/>
-          <a:extLst>
-            <a:ext uri="{909E8E84-426E-40DD-AFC4-6F175D3DCCD1}">
-              <a14:hiddenFill xmlns:a14="http://schemas.microsoft.com/office/drawing/2010/main">
-                <a:solidFill>
-                  <a:srgbClr val="FFFFFF"/>
-                </a:solidFill>
-              </a14:hiddenFill>
-            </a:ext>
-          </a:extLst>
-        </p:spPr>
-      </p:pic>
-      <p:sp>
-        <p:nvSpPr>
-          <p:cNvPr id="49" name="Arrow: Left 48">
-            <a:extLst>
-              <a:ext uri="{FF2B5EF4-FFF2-40B4-BE49-F238E27FC236}">
-                <a16:creationId xmlns:a16="http://schemas.microsoft.com/office/drawing/2014/main" id="{5A56997F-7AC2-47CC-969E-4857F13073ED}"/>
-              </a:ext>
-            </a:extLst>
-          </p:cNvPr>
-          <p:cNvSpPr/>
-          <p:nvPr/>
-        </p:nvSpPr>
-        <p:spPr>
-          <a:xfrm>
-            <a:off x="7523813" y="6202222"/>
-            <a:ext cx="1481673" cy="536373"/>
-          </a:xfrm>
-          <a:prstGeom prst="leftArrow">
-            <a:avLst/>
-          </a:prstGeom>
-          <a:solidFill>
-            <a:srgbClr val="002060"/>
-          </a:solidFill>
-        </p:spPr>
-        <p:style>
-          <a:lnRef idx="2">
-            <a:schemeClr val="accent1">
-              <a:shade val="50000"/>
-            </a:schemeClr>
-          </a:lnRef>
-          <a:fillRef idx="1">
-            <a:schemeClr val="accent1"/>
-          </a:fillRef>
-          <a:effectRef idx="0">
-            <a:schemeClr val="accent1"/>
-          </a:effectRef>
-          <a:fontRef idx="minor">
-            <a:schemeClr val="lt1"/>
-          </a:fontRef>
-        </p:style>
-        <p:txBody>
-          <a:bodyPr rtlCol="0" anchor="ctr"/>
-          <a:lstStyle/>
-          <a:p>
-            <a:pPr algn="ctr"/>
-            <a:r>
-              <a:rPr lang="en-US" sz="1200" dirty="0"/>
-              <a:t>Ongoing query</a:t>
-            </a:r>
-            <a:endParaRPr lang="en-GB" sz="1200" dirty="0"/>
-          </a:p>
-        </p:txBody>
-      </p:sp>
-      <p:sp>
-        <p:nvSpPr>
-          <p:cNvPr id="55" name="Arrow: Left-Right 54">
-            <a:extLst>
-              <a:ext uri="{FF2B5EF4-FFF2-40B4-BE49-F238E27FC236}">
-                <a16:creationId xmlns:a16="http://schemas.microsoft.com/office/drawing/2014/main" id="{259DC383-2E0B-437C-8921-FE18CF693B92}"/>
-              </a:ext>
-            </a:extLst>
-          </p:cNvPr>
-          <p:cNvSpPr/>
-          <p:nvPr/>
-        </p:nvSpPr>
-        <p:spPr>
-          <a:xfrm>
-            <a:off x="9025764" y="6120750"/>
-            <a:ext cx="1228274" cy="651609"/>
-          </a:xfrm>
-          <a:prstGeom prst="leftRightArrow">
-            <a:avLst/>
-          </a:prstGeom>
-          <a:noFill/>
-          <a:ln w="28575">
-            <a:prstDash val="sysDash"/>
-          </a:ln>
-        </p:spPr>
-        <p:style>
-          <a:lnRef idx="2">
-            <a:schemeClr val="accent1">
-              <a:shade val="50000"/>
-            </a:schemeClr>
-          </a:lnRef>
-          <a:fillRef idx="1">
-            <a:schemeClr val="accent1"/>
-          </a:fillRef>
-          <a:effectRef idx="0">
-            <a:schemeClr val="accent1"/>
-          </a:effectRef>
-          <a:fontRef idx="minor">
-            <a:schemeClr val="lt1"/>
-          </a:fontRef>
-        </p:style>
-        <p:txBody>
-          <a:bodyPr rtlCol="0" anchor="ctr"/>
-          <a:lstStyle/>
-          <a:p>
-            <a:pPr algn="ctr"/>
-            <a:r>
-              <a:rPr lang="en-US" sz="800" dirty="0">
-                <a:solidFill>
-                  <a:sysClr val="windowText" lastClr="000000"/>
-                </a:solidFill>
-              </a:rPr>
-              <a:t>Check presence of RPA Thread</a:t>
-            </a:r>
-            <a:endParaRPr lang="en-GB" sz="800" dirty="0">
-              <a:solidFill>
-                <a:sysClr val="windowText" lastClr="000000"/>
-              </a:solidFill>
-            </a:endParaRPr>
-          </a:p>
-        </p:txBody>
-      </p:sp>
-      <p:sp>
-        <p:nvSpPr>
-          <p:cNvPr id="56" name="TextBox 55">
-            <a:extLst>
-              <a:ext uri="{FF2B5EF4-FFF2-40B4-BE49-F238E27FC236}">
-                <a16:creationId xmlns:a16="http://schemas.microsoft.com/office/drawing/2014/main" id="{C2BAF97D-30BA-4029-B334-24A6EAFD18B0}"/>
-              </a:ext>
-            </a:extLst>
-          </p:cNvPr>
-          <p:cNvSpPr txBox="1"/>
-          <p:nvPr/>
-        </p:nvSpPr>
-        <p:spPr>
-          <a:xfrm>
-            <a:off x="7302164" y="5951161"/>
-            <a:ext cx="1501951" cy="261610"/>
-          </a:xfrm>
-          <a:prstGeom prst="rect">
-            <a:avLst/>
-          </a:prstGeom>
-          <a:solidFill>
-            <a:schemeClr val="accent4">
-              <a:lumMod val="20000"/>
-              <a:lumOff val="80000"/>
-            </a:schemeClr>
-          </a:solidFill>
-          <a:ln>
-            <a:solidFill>
-              <a:schemeClr val="tx1"/>
-            </a:solidFill>
-          </a:ln>
-          <a:effectLst>
-            <a:outerShdw blurRad="50800" dist="38100" dir="2700000" algn="tl" rotWithShape="0">
-              <a:prstClr val="black">
-                <a:alpha val="40000"/>
-              </a:prstClr>
-            </a:outerShdw>
-          </a:effectLst>
-        </p:spPr>
-        <p:txBody>
-          <a:bodyPr wrap="square" rtlCol="0">
-            <a:spAutoFit/>
-          </a:bodyPr>
-          <a:lstStyle/>
-          <a:p>
-            <a:pPr algn="ctr"/>
-            <a:r>
-              <a:rPr lang="en-US" sz="1100" dirty="0"/>
-              <a:t>Welcome Intent</a:t>
-            </a:r>
-            <a:endParaRPr lang="en-GB" sz="1100" dirty="0"/>
           </a:p>
         </p:txBody>
       </p:sp>

</xml_diff>

<commit_message>
updated logos on slide 4
</commit_message>
<xml_diff>
--- a/Video/ISS IPA PROJECT PRESENTATION - SYSTEM ARCHITECTURE.pptx
+++ b/Video/ISS IPA PROJECT PRESENTATION - SYSTEM ARCHITECTURE.pptx
@@ -8,7 +8,7 @@
     <p:sldId id="256" r:id="rId2"/>
     <p:sldId id="260" r:id="rId3"/>
     <p:sldId id="257" r:id="rId4"/>
-    <p:sldId id="261" r:id="rId5"/>
+    <p:sldId id="267" r:id="rId5"/>
     <p:sldId id="262" r:id="rId6"/>
     <p:sldId id="263" r:id="rId7"/>
     <p:sldId id="264" r:id="rId8"/>
@@ -3112,7 +3112,7 @@
           <a:p>
             <a:fld id="{A5DFF91C-4E09-4FFC-8A24-B7B9DFB15E04}" type="datetimeFigureOut">
               <a:rPr lang="en-SG" smtClean="0"/>
-              <a:t>27/4/2021</a:t>
+              <a:t>29/4/2021</a:t>
             </a:fld>
             <a:endParaRPr lang="en-SG"/>
           </a:p>
@@ -3312,7 +3312,7 @@
           <a:p>
             <a:fld id="{A5DFF91C-4E09-4FFC-8A24-B7B9DFB15E04}" type="datetimeFigureOut">
               <a:rPr lang="en-SG" smtClean="0"/>
-              <a:t>27/4/2021</a:t>
+              <a:t>29/4/2021</a:t>
             </a:fld>
             <a:endParaRPr lang="en-SG"/>
           </a:p>
@@ -3522,7 +3522,7 @@
           <a:p>
             <a:fld id="{A5DFF91C-4E09-4FFC-8A24-B7B9DFB15E04}" type="datetimeFigureOut">
               <a:rPr lang="en-SG" smtClean="0"/>
-              <a:t>27/4/2021</a:t>
+              <a:t>29/4/2021</a:t>
             </a:fld>
             <a:endParaRPr lang="en-SG"/>
           </a:p>
@@ -3722,7 +3722,7 @@
           <a:p>
             <a:fld id="{A5DFF91C-4E09-4FFC-8A24-B7B9DFB15E04}" type="datetimeFigureOut">
               <a:rPr lang="en-SG" smtClean="0"/>
-              <a:t>27/4/2021</a:t>
+              <a:t>29/4/2021</a:t>
             </a:fld>
             <a:endParaRPr lang="en-SG"/>
           </a:p>
@@ -3998,7 +3998,7 @@
           <a:p>
             <a:fld id="{A5DFF91C-4E09-4FFC-8A24-B7B9DFB15E04}" type="datetimeFigureOut">
               <a:rPr lang="en-SG" smtClean="0"/>
-              <a:t>27/4/2021</a:t>
+              <a:t>29/4/2021</a:t>
             </a:fld>
             <a:endParaRPr lang="en-SG"/>
           </a:p>
@@ -4266,7 +4266,7 @@
           <a:p>
             <a:fld id="{A5DFF91C-4E09-4FFC-8A24-B7B9DFB15E04}" type="datetimeFigureOut">
               <a:rPr lang="en-SG" smtClean="0"/>
-              <a:t>27/4/2021</a:t>
+              <a:t>29/4/2021</a:t>
             </a:fld>
             <a:endParaRPr lang="en-SG"/>
           </a:p>
@@ -4681,7 +4681,7 @@
           <a:p>
             <a:fld id="{A5DFF91C-4E09-4FFC-8A24-B7B9DFB15E04}" type="datetimeFigureOut">
               <a:rPr lang="en-SG" smtClean="0"/>
-              <a:t>27/4/2021</a:t>
+              <a:t>29/4/2021</a:t>
             </a:fld>
             <a:endParaRPr lang="en-SG"/>
           </a:p>
@@ -4823,7 +4823,7 @@
           <a:p>
             <a:fld id="{A5DFF91C-4E09-4FFC-8A24-B7B9DFB15E04}" type="datetimeFigureOut">
               <a:rPr lang="en-SG" smtClean="0"/>
-              <a:t>27/4/2021</a:t>
+              <a:t>29/4/2021</a:t>
             </a:fld>
             <a:endParaRPr lang="en-SG"/>
           </a:p>
@@ -4936,7 +4936,7 @@
           <a:p>
             <a:fld id="{A5DFF91C-4E09-4FFC-8A24-B7B9DFB15E04}" type="datetimeFigureOut">
               <a:rPr lang="en-SG" smtClean="0"/>
-              <a:t>27/4/2021</a:t>
+              <a:t>29/4/2021</a:t>
             </a:fld>
             <a:endParaRPr lang="en-SG"/>
           </a:p>
@@ -5249,7 +5249,7 @@
           <a:p>
             <a:fld id="{A5DFF91C-4E09-4FFC-8A24-B7B9DFB15E04}" type="datetimeFigureOut">
               <a:rPr lang="en-SG" smtClean="0"/>
-              <a:t>27/4/2021</a:t>
+              <a:t>29/4/2021</a:t>
             </a:fld>
             <a:endParaRPr lang="en-SG"/>
           </a:p>
@@ -5538,7 +5538,7 @@
           <a:p>
             <a:fld id="{A5DFF91C-4E09-4FFC-8A24-B7B9DFB15E04}" type="datetimeFigureOut">
               <a:rPr lang="en-SG" smtClean="0"/>
-              <a:t>27/4/2021</a:t>
+              <a:t>29/4/2021</a:t>
             </a:fld>
             <a:endParaRPr lang="en-SG"/>
           </a:p>
@@ -5781,7 +5781,7 @@
           <a:p>
             <a:fld id="{A5DFF91C-4E09-4FFC-8A24-B7B9DFB15E04}" type="datetimeFigureOut">
               <a:rPr lang="en-SG" smtClean="0"/>
-              <a:t>27/4/2021</a:t>
+              <a:t>29/4/2021</a:t>
             </a:fld>
             <a:endParaRPr lang="en-SG"/>
           </a:p>
@@ -9296,6 +9296,579 @@
       </p:sp>
       <p:sp>
         <p:nvSpPr>
+          <p:cNvPr id="31" name="Rectangle 30">
+            <a:extLst>
+              <a:ext uri="{FF2B5EF4-FFF2-40B4-BE49-F238E27FC236}">
+                <a16:creationId xmlns:a16="http://schemas.microsoft.com/office/drawing/2014/main" id="{0872BC5F-BD41-4A94-B46D-E7EFFA0F55D7}"/>
+              </a:ext>
+            </a:extLst>
+          </p:cNvPr>
+          <p:cNvSpPr/>
+          <p:nvPr/>
+        </p:nvSpPr>
+        <p:spPr>
+          <a:xfrm>
+            <a:off x="4594015" y="4410624"/>
+            <a:ext cx="2915919" cy="1857983"/>
+          </a:xfrm>
+          <a:prstGeom prst="rect">
+            <a:avLst/>
+          </a:prstGeom>
+          <a:noFill/>
+          <a:ln w="25400">
+            <a:solidFill>
+              <a:srgbClr val="EA4335"/>
+            </a:solidFill>
+          </a:ln>
+        </p:spPr>
+        <p:style>
+          <a:lnRef idx="2">
+            <a:schemeClr val="accent1">
+              <a:shade val="50000"/>
+            </a:schemeClr>
+          </a:lnRef>
+          <a:fillRef idx="1">
+            <a:schemeClr val="accent1"/>
+          </a:fillRef>
+          <a:effectRef idx="0">
+            <a:schemeClr val="accent1"/>
+          </a:effectRef>
+          <a:fontRef idx="minor">
+            <a:schemeClr val="lt1"/>
+          </a:fontRef>
+        </p:style>
+        <p:txBody>
+          <a:bodyPr rtlCol="0" anchor="ctr"/>
+          <a:lstStyle/>
+          <a:p>
+            <a:pPr marL="285750" indent="-285750">
+              <a:buFont typeface="Arial" panose="020B0604020202020204" pitchFamily="34" charset="0"/>
+              <a:buChar char="•"/>
+            </a:pPr>
+            <a:r>
+              <a:rPr lang="en-SG" dirty="0">
+                <a:solidFill>
+                  <a:schemeClr val="tx1"/>
+                </a:solidFill>
+              </a:rPr>
+              <a:t>Powered by UI Tag</a:t>
+            </a:r>
+          </a:p>
+        </p:txBody>
+      </p:sp>
+      <p:sp>
+        <p:nvSpPr>
+          <p:cNvPr id="32" name="Rectangle 31">
+            <a:extLst>
+              <a:ext uri="{FF2B5EF4-FFF2-40B4-BE49-F238E27FC236}">
+                <a16:creationId xmlns:a16="http://schemas.microsoft.com/office/drawing/2014/main" id="{263A4C2F-3FCE-4954-87E5-2E588684D122}"/>
+              </a:ext>
+            </a:extLst>
+          </p:cNvPr>
+          <p:cNvSpPr/>
+          <p:nvPr/>
+        </p:nvSpPr>
+        <p:spPr>
+          <a:xfrm>
+            <a:off x="8780202" y="4359260"/>
+            <a:ext cx="2915919" cy="1857983"/>
+          </a:xfrm>
+          <a:prstGeom prst="rect">
+            <a:avLst/>
+          </a:prstGeom>
+          <a:noFill/>
+          <a:ln w="25400">
+            <a:solidFill>
+              <a:srgbClr val="FBBC05"/>
+            </a:solidFill>
+          </a:ln>
+        </p:spPr>
+        <p:style>
+          <a:lnRef idx="2">
+            <a:schemeClr val="accent1">
+              <a:shade val="50000"/>
+            </a:schemeClr>
+          </a:lnRef>
+          <a:fillRef idx="1">
+            <a:schemeClr val="accent1"/>
+          </a:fillRef>
+          <a:effectRef idx="0">
+            <a:schemeClr val="accent1"/>
+          </a:effectRef>
+          <a:fontRef idx="minor">
+            <a:schemeClr val="lt1"/>
+          </a:fontRef>
+        </p:style>
+        <p:txBody>
+          <a:bodyPr rtlCol="0" anchor="ctr"/>
+          <a:lstStyle/>
+          <a:p>
+            <a:pPr marL="285750" indent="-285750">
+              <a:buFont typeface="Arial" panose="020B0604020202020204" pitchFamily="34" charset="0"/>
+              <a:buChar char="•"/>
+            </a:pPr>
+            <a:r>
+              <a:rPr lang="en-SG" dirty="0">
+                <a:solidFill>
+                  <a:schemeClr val="tx1"/>
+                </a:solidFill>
+              </a:rPr>
+              <a:t>Powered by Bert </a:t>
+            </a:r>
+          </a:p>
+        </p:txBody>
+      </p:sp>
+      <p:pic>
+        <p:nvPicPr>
+          <p:cNvPr id="9" name="Picture 8">
+            <a:extLst>
+              <a:ext uri="{FF2B5EF4-FFF2-40B4-BE49-F238E27FC236}">
+                <a16:creationId xmlns:a16="http://schemas.microsoft.com/office/drawing/2014/main" id="{9E0F87DA-55CB-4B07-85D3-CD32A59E5178}"/>
+              </a:ext>
+            </a:extLst>
+          </p:cNvPr>
+          <p:cNvPicPr>
+            <a:picLocks noChangeAspect="1"/>
+          </p:cNvPicPr>
+          <p:nvPr/>
+        </p:nvPicPr>
+        <p:blipFill>
+          <a:blip r:embed="rId2"/>
+          <a:stretch>
+            <a:fillRect/>
+          </a:stretch>
+        </p:blipFill>
+        <p:spPr>
+          <a:xfrm>
+            <a:off x="701092" y="1512343"/>
+            <a:ext cx="2590024" cy="1333850"/>
+          </a:xfrm>
+          <a:prstGeom prst="rect">
+            <a:avLst/>
+          </a:prstGeom>
+        </p:spPr>
+      </p:pic>
+      <p:pic>
+        <p:nvPicPr>
+          <p:cNvPr id="36" name="Picture 2" descr="Google Assistant - Wikipedia">
+            <a:extLst>
+              <a:ext uri="{FF2B5EF4-FFF2-40B4-BE49-F238E27FC236}">
+                <a16:creationId xmlns:a16="http://schemas.microsoft.com/office/drawing/2014/main" id="{2BA0ECC8-1A81-48E9-807F-381E5C63762F}"/>
+              </a:ext>
+            </a:extLst>
+          </p:cNvPr>
+          <p:cNvPicPr>
+            <a:picLocks noChangeAspect="1" noChangeArrowheads="1"/>
+          </p:cNvPicPr>
+          <p:nvPr/>
+        </p:nvPicPr>
+        <p:blipFill>
+          <a:blip r:embed="rId3">
+            <a:extLst>
+              <a:ext uri="{28A0092B-C50C-407E-A947-70E740481C1C}">
+                <a14:useLocalDpi xmlns:a14="http://schemas.microsoft.com/office/drawing/2010/main" val="0"/>
+              </a:ext>
+            </a:extLst>
+          </a:blip>
+          <a:srcRect/>
+          <a:stretch>
+            <a:fillRect/>
+          </a:stretch>
+        </p:blipFill>
+        <p:spPr bwMode="auto">
+          <a:xfrm>
+            <a:off x="2787275" y="620462"/>
+            <a:ext cx="1189127" cy="1190271"/>
+          </a:xfrm>
+          <a:prstGeom prst="rect">
+            <a:avLst/>
+          </a:prstGeom>
+          <a:noFill/>
+          <a:extLst>
+            <a:ext uri="{909E8E84-426E-40DD-AFC4-6F175D3DCCD1}">
+              <a14:hiddenFill xmlns:a14="http://schemas.microsoft.com/office/drawing/2010/main">
+                <a:solidFill>
+                  <a:srgbClr val="FFFFFF"/>
+                </a:solidFill>
+              </a14:hiddenFill>
+            </a:ext>
+          </a:extLst>
+        </p:spPr>
+      </p:pic>
+      <p:pic>
+        <p:nvPicPr>
+          <p:cNvPr id="1026" name="Picture 2" descr="Amazon to expand to South East Asia through Singapore - KLGadgetGuy">
+            <a:extLst>
+              <a:ext uri="{FF2B5EF4-FFF2-40B4-BE49-F238E27FC236}">
+                <a16:creationId xmlns:a16="http://schemas.microsoft.com/office/drawing/2014/main" id="{10D99925-2D82-42A7-BC92-60BD91ABD7F2}"/>
+              </a:ext>
+            </a:extLst>
+          </p:cNvPr>
+          <p:cNvPicPr>
+            <a:picLocks noChangeAspect="1" noChangeArrowheads="1"/>
+          </p:cNvPicPr>
+          <p:nvPr/>
+        </p:nvPicPr>
+        <p:blipFill rotWithShape="1">
+          <a:blip r:embed="rId4">
+            <a:extLst>
+              <a:ext uri="{28A0092B-C50C-407E-A947-70E740481C1C}">
+                <a14:useLocalDpi xmlns:a14="http://schemas.microsoft.com/office/drawing/2010/main" val="0"/>
+              </a:ext>
+            </a:extLst>
+          </a:blip>
+          <a:srcRect l="7264" t="29085" r="7174" b="34689"/>
+          <a:stretch/>
+        </p:blipFill>
+        <p:spPr bwMode="auto">
+          <a:xfrm>
+            <a:off x="6225471" y="1397231"/>
+            <a:ext cx="1730449" cy="732652"/>
+          </a:xfrm>
+          <a:prstGeom prst="rect">
+            <a:avLst/>
+          </a:prstGeom>
+          <a:noFill/>
+          <a:extLst>
+            <a:ext uri="{909E8E84-426E-40DD-AFC4-6F175D3DCCD1}">
+              <a14:hiddenFill xmlns:a14="http://schemas.microsoft.com/office/drawing/2010/main">
+                <a:solidFill>
+                  <a:srgbClr val="FFFFFF"/>
+                </a:solidFill>
+              </a14:hiddenFill>
+            </a:ext>
+          </a:extLst>
+        </p:spPr>
+      </p:pic>
+      <p:pic>
+        <p:nvPicPr>
+          <p:cNvPr id="1028" name="Picture 4" descr="Global Civica Office Locations Civica - induced.info">
+            <a:extLst>
+              <a:ext uri="{FF2B5EF4-FFF2-40B4-BE49-F238E27FC236}">
+                <a16:creationId xmlns:a16="http://schemas.microsoft.com/office/drawing/2014/main" id="{406ABC36-8590-4A24-AB54-21773F5013C8}"/>
+              </a:ext>
+            </a:extLst>
+          </p:cNvPr>
+          <p:cNvPicPr>
+            <a:picLocks noChangeAspect="1" noChangeArrowheads="1"/>
+          </p:cNvPicPr>
+          <p:nvPr/>
+        </p:nvPicPr>
+        <p:blipFill rotWithShape="1">
+          <a:blip r:embed="rId5">
+            <a:extLst>
+              <a:ext uri="{28A0092B-C50C-407E-A947-70E740481C1C}">
+                <a14:useLocalDpi xmlns:a14="http://schemas.microsoft.com/office/drawing/2010/main" val="0"/>
+              </a:ext>
+            </a:extLst>
+          </a:blip>
+          <a:srcRect l="12647" t="19936"/>
+          <a:stretch/>
+        </p:blipFill>
+        <p:spPr bwMode="auto">
+          <a:xfrm>
+            <a:off x="4463092" y="1121982"/>
+            <a:ext cx="1762379" cy="1371221"/>
+          </a:xfrm>
+          <a:prstGeom prst="rect">
+            <a:avLst/>
+          </a:prstGeom>
+          <a:noFill/>
+          <a:extLst>
+            <a:ext uri="{909E8E84-426E-40DD-AFC4-6F175D3DCCD1}">
+              <a14:hiddenFill xmlns:a14="http://schemas.microsoft.com/office/drawing/2010/main">
+                <a:solidFill>
+                  <a:srgbClr val="FFFFFF"/>
+                </a:solidFill>
+              </a14:hiddenFill>
+            </a:ext>
+          </a:extLst>
+        </p:spPr>
+      </p:pic>
+      <p:pic>
+        <p:nvPicPr>
+          <p:cNvPr id="1030" name="Picture 6" descr="Building a More Intelligent Enterprise">
+            <a:extLst>
+              <a:ext uri="{FF2B5EF4-FFF2-40B4-BE49-F238E27FC236}">
+                <a16:creationId xmlns:a16="http://schemas.microsoft.com/office/drawing/2014/main" id="{8B61D762-D553-41C8-BDFB-2008277CCCEA}"/>
+              </a:ext>
+            </a:extLst>
+          </p:cNvPr>
+          <p:cNvPicPr>
+            <a:picLocks noChangeAspect="1" noChangeArrowheads="1"/>
+          </p:cNvPicPr>
+          <p:nvPr/>
+        </p:nvPicPr>
+        <p:blipFill>
+          <a:blip r:embed="rId6">
+            <a:extLst>
+              <a:ext uri="{28A0092B-C50C-407E-A947-70E740481C1C}">
+                <a14:useLocalDpi xmlns:a14="http://schemas.microsoft.com/office/drawing/2010/main" val="0"/>
+              </a:ext>
+            </a:extLst>
+          </a:blip>
+          <a:srcRect/>
+          <a:stretch>
+            <a:fillRect/>
+          </a:stretch>
+        </p:blipFill>
+        <p:spPr bwMode="auto">
+          <a:xfrm>
+            <a:off x="9076850" y="767323"/>
+            <a:ext cx="1992469" cy="1992469"/>
+          </a:xfrm>
+          <a:prstGeom prst="rect">
+            <a:avLst/>
+          </a:prstGeom>
+          <a:noFill/>
+          <a:extLst>
+            <a:ext uri="{909E8E84-426E-40DD-AFC4-6F175D3DCCD1}">
+              <a14:hiddenFill xmlns:a14="http://schemas.microsoft.com/office/drawing/2010/main">
+                <a:solidFill>
+                  <a:srgbClr val="FFFFFF"/>
+                </a:solidFill>
+              </a14:hiddenFill>
+            </a:ext>
+          </a:extLst>
+        </p:spPr>
+      </p:pic>
+      <p:pic>
+        <p:nvPicPr>
+          <p:cNvPr id="2" name="Picture 2">
+            <a:extLst>
+              <a:ext uri="{FF2B5EF4-FFF2-40B4-BE49-F238E27FC236}">
+                <a16:creationId xmlns:a16="http://schemas.microsoft.com/office/drawing/2014/main" id="{E9ACEE18-34A1-433F-BCE3-148909EDB217}"/>
+              </a:ext>
+            </a:extLst>
+          </p:cNvPr>
+          <p:cNvPicPr>
+            <a:picLocks noChangeAspect="1" noChangeArrowheads="1"/>
+          </p:cNvPicPr>
+          <p:nvPr/>
+        </p:nvPicPr>
+        <p:blipFill>
+          <a:blip r:embed="rId7">
+            <a:extLst>
+              <a:ext uri="{28A0092B-C50C-407E-A947-70E740481C1C}">
+                <a14:useLocalDpi xmlns:a14="http://schemas.microsoft.com/office/drawing/2010/main" val="0"/>
+              </a:ext>
+            </a:extLst>
+          </a:blip>
+          <a:srcRect/>
+          <a:stretch>
+            <a:fillRect/>
+          </a:stretch>
+        </p:blipFill>
+        <p:spPr bwMode="auto">
+          <a:xfrm>
+            <a:off x="800548" y="5613355"/>
+            <a:ext cx="1851870" cy="490456"/>
+          </a:xfrm>
+          <a:prstGeom prst="rect">
+            <a:avLst/>
+          </a:prstGeom>
+          <a:solidFill>
+            <a:schemeClr val="bg1"/>
+          </a:solidFill>
+        </p:spPr>
+      </p:pic>
+      <p:pic>
+        <p:nvPicPr>
+          <p:cNvPr id="17" name="Picture 6" descr="Release 6.14.0">
+            <a:extLst>
+              <a:ext uri="{FF2B5EF4-FFF2-40B4-BE49-F238E27FC236}">
+                <a16:creationId xmlns:a16="http://schemas.microsoft.com/office/drawing/2014/main" id="{B9708D2D-7439-4C37-9549-9E86CF20F61F}"/>
+              </a:ext>
+            </a:extLst>
+          </p:cNvPr>
+          <p:cNvPicPr>
+            <a:picLocks noChangeAspect="1" noChangeArrowheads="1"/>
+          </p:cNvPicPr>
+          <p:nvPr/>
+        </p:nvPicPr>
+        <p:blipFill>
+          <a:blip r:embed="rId8">
+            <a:extLst>
+              <a:ext uri="{28A0092B-C50C-407E-A947-70E740481C1C}">
+                <a14:useLocalDpi xmlns:a14="http://schemas.microsoft.com/office/drawing/2010/main" val="0"/>
+              </a:ext>
+            </a:extLst>
+          </a:blip>
+          <a:srcRect/>
+          <a:stretch>
+            <a:fillRect/>
+          </a:stretch>
+        </p:blipFill>
+        <p:spPr bwMode="auto">
+          <a:xfrm>
+            <a:off x="4725767" y="4875152"/>
+            <a:ext cx="2626842" cy="962940"/>
+          </a:xfrm>
+          <a:prstGeom prst="rect">
+            <a:avLst/>
+          </a:prstGeom>
+          <a:noFill/>
+          <a:effectLst>
+            <a:outerShdw blurRad="50800" dist="38100" dir="2700000" algn="tl" rotWithShape="0">
+              <a:prstClr val="black">
+                <a:alpha val="40000"/>
+              </a:prstClr>
+            </a:outerShdw>
+          </a:effectLst>
+          <a:extLst>
+            <a:ext uri="{909E8E84-426E-40DD-AFC4-6F175D3DCCD1}">
+              <a14:hiddenFill xmlns:a14="http://schemas.microsoft.com/office/drawing/2010/main">
+                <a:solidFill>
+                  <a:srgbClr val="FFFFFF"/>
+                </a:solidFill>
+              </a14:hiddenFill>
+            </a:ext>
+          </a:extLst>
+        </p:spPr>
+      </p:pic>
+      <p:pic>
+        <p:nvPicPr>
+          <p:cNvPr id="4" name="Picture 4" descr="Google Assistant gets 'Tell Me a Story' feature on Android and iOS -  SlashGear">
+            <a:extLst>
+              <a:ext uri="{FF2B5EF4-FFF2-40B4-BE49-F238E27FC236}">
+                <a16:creationId xmlns:a16="http://schemas.microsoft.com/office/drawing/2014/main" id="{40144525-B641-4A23-9A3B-F1997C4914D3}"/>
+              </a:ext>
+            </a:extLst>
+          </p:cNvPr>
+          <p:cNvPicPr>
+            <a:picLocks noChangeAspect="1" noChangeArrowheads="1"/>
+          </p:cNvPicPr>
+          <p:nvPr/>
+        </p:nvPicPr>
+        <p:blipFill>
+          <a:blip r:embed="rId9">
+            <a:extLst>
+              <a:ext uri="{28A0092B-C50C-407E-A947-70E740481C1C}">
+                <a14:useLocalDpi xmlns:a14="http://schemas.microsoft.com/office/drawing/2010/main" val="0"/>
+              </a:ext>
+            </a:extLst>
+          </a:blip>
+          <a:srcRect/>
+          <a:stretch>
+            <a:fillRect/>
+          </a:stretch>
+        </p:blipFill>
+        <p:spPr bwMode="auto">
+          <a:xfrm>
+            <a:off x="1754256" y="4429877"/>
+            <a:ext cx="2076846" cy="1286295"/>
+          </a:xfrm>
+          <a:prstGeom prst="rect">
+            <a:avLst/>
+          </a:prstGeom>
+          <a:noFill/>
+          <a:extLst>
+            <a:ext uri="{909E8E84-426E-40DD-AFC4-6F175D3DCCD1}">
+              <a14:hiddenFill xmlns:a14="http://schemas.microsoft.com/office/drawing/2010/main">
+                <a:solidFill>
+                  <a:srgbClr val="FFFFFF"/>
+                </a:solidFill>
+              </a14:hiddenFill>
+            </a:ext>
+          </a:extLst>
+        </p:spPr>
+      </p:pic>
+      <p:pic>
+        <p:nvPicPr>
+          <p:cNvPr id="5" name="Picture 6" descr="Gmail has a new logo that's a lot more Google - The Verge">
+            <a:extLst>
+              <a:ext uri="{FF2B5EF4-FFF2-40B4-BE49-F238E27FC236}">
+                <a16:creationId xmlns:a16="http://schemas.microsoft.com/office/drawing/2014/main" id="{E67AA7C0-A72F-42E0-82C5-086A791003BC}"/>
+              </a:ext>
+            </a:extLst>
+          </p:cNvPr>
+          <p:cNvPicPr>
+            <a:picLocks noChangeAspect="1" noChangeArrowheads="1"/>
+          </p:cNvPicPr>
+          <p:nvPr/>
+        </p:nvPicPr>
+        <p:blipFill>
+          <a:blip r:embed="rId10">
+            <a:extLst>
+              <a:ext uri="{28A0092B-C50C-407E-A947-70E740481C1C}">
+                <a14:useLocalDpi xmlns:a14="http://schemas.microsoft.com/office/drawing/2010/main" val="0"/>
+              </a:ext>
+            </a:extLst>
+          </a:blip>
+          <a:srcRect/>
+          <a:stretch>
+            <a:fillRect/>
+          </a:stretch>
+        </p:blipFill>
+        <p:spPr bwMode="auto">
+          <a:xfrm>
+            <a:off x="839516" y="4638419"/>
+            <a:ext cx="1423986" cy="800099"/>
+          </a:xfrm>
+          <a:prstGeom prst="rect">
+            <a:avLst/>
+          </a:prstGeom>
+          <a:noFill/>
+          <a:extLst>
+            <a:ext uri="{909E8E84-426E-40DD-AFC4-6F175D3DCCD1}">
+              <a14:hiddenFill xmlns:a14="http://schemas.microsoft.com/office/drawing/2010/main">
+                <a:solidFill>
+                  <a:srgbClr val="FFFFFF"/>
+                </a:solidFill>
+              </a14:hiddenFill>
+            </a:ext>
+          </a:extLst>
+        </p:spPr>
+      </p:pic>
+      <p:pic>
+        <p:nvPicPr>
+          <p:cNvPr id="1032" name="Picture 8" descr="GitHub - RaRe-Technologies/gensim: Topic Modelling for Humans">
+            <a:extLst>
+              <a:ext uri="{FF2B5EF4-FFF2-40B4-BE49-F238E27FC236}">
+                <a16:creationId xmlns:a16="http://schemas.microsoft.com/office/drawing/2014/main" id="{F8FDBA89-47F0-4714-B21B-6EC8165CA655}"/>
+              </a:ext>
+            </a:extLst>
+          </p:cNvPr>
+          <p:cNvPicPr>
+            <a:picLocks noChangeAspect="1" noChangeArrowheads="1"/>
+          </p:cNvPicPr>
+          <p:nvPr/>
+        </p:nvPicPr>
+        <p:blipFill>
+          <a:blip r:embed="rId11">
+            <a:extLst>
+              <a:ext uri="{28A0092B-C50C-407E-A947-70E740481C1C}">
+                <a14:useLocalDpi xmlns:a14="http://schemas.microsoft.com/office/drawing/2010/main" val="0"/>
+              </a:ext>
+            </a:extLst>
+          </a:blip>
+          <a:srcRect/>
+          <a:stretch>
+            <a:fillRect/>
+          </a:stretch>
+        </p:blipFill>
+        <p:spPr bwMode="auto">
+          <a:xfrm>
+            <a:off x="8878603" y="4423908"/>
+            <a:ext cx="2434810" cy="959655"/>
+          </a:xfrm>
+          <a:prstGeom prst="rect">
+            <a:avLst/>
+          </a:prstGeom>
+          <a:noFill/>
+          <a:extLst>
+            <a:ext uri="{909E8E84-426E-40DD-AFC4-6F175D3DCCD1}">
+              <a14:hiddenFill xmlns:a14="http://schemas.microsoft.com/office/drawing/2010/main">
+                <a:solidFill>
+                  <a:srgbClr val="FFFFFF"/>
+                </a:solidFill>
+              </a14:hiddenFill>
+            </a:ext>
+          </a:extLst>
+        </p:spPr>
+      </p:pic>
+      <p:sp>
+        <p:nvSpPr>
           <p:cNvPr id="30" name="Rectangle 29">
             <a:extLst>
               <a:ext uri="{FF2B5EF4-FFF2-40B4-BE49-F238E27FC236}">
@@ -9345,215 +9918,20 @@
               <a:buFont typeface="Arial" panose="020B0604020202020204" pitchFamily="34" charset="0"/>
               <a:buChar char="•"/>
             </a:pPr>
-            <a:r>
-              <a:rPr lang="en-SG" dirty="0">
-                <a:solidFill>
-                  <a:schemeClr val="tx1"/>
-                </a:solidFill>
-              </a:rPr>
-              <a:t>Powered by Google Assistant &amp; </a:t>
-            </a:r>
-            <a:r>
-              <a:rPr lang="en-SG" dirty="0" err="1">
-                <a:solidFill>
-                  <a:schemeClr val="tx1"/>
-                </a:solidFill>
-              </a:rPr>
-              <a:t>Dialogflow</a:t>
-            </a:r>
             <a:endParaRPr lang="en-SG" dirty="0">
               <a:solidFill>
                 <a:schemeClr val="tx1"/>
               </a:solidFill>
             </a:endParaRPr>
           </a:p>
-          <a:p>
-            <a:pPr marL="285750" indent="-285750">
-              <a:buFont typeface="Arial" panose="020B0604020202020204" pitchFamily="34" charset="0"/>
-              <a:buChar char="•"/>
-            </a:pPr>
-            <a:endParaRPr lang="en-SG" dirty="0">
-              <a:solidFill>
-                <a:schemeClr val="tx1"/>
-              </a:solidFill>
-            </a:endParaRPr>
-          </a:p>
-          <a:p>
-            <a:pPr marL="285750" indent="-285750">
-              <a:buFont typeface="Arial" panose="020B0604020202020204" pitchFamily="34" charset="0"/>
-              <a:buChar char="•"/>
-            </a:pPr>
-            <a:r>
-              <a:rPr lang="en-SG" dirty="0">
-                <a:solidFill>
-                  <a:schemeClr val="tx1"/>
-                </a:solidFill>
-              </a:rPr>
-              <a:t>Powered by Gmail</a:t>
-            </a:r>
-          </a:p>
-        </p:txBody>
-      </p:sp>
-      <p:sp>
-        <p:nvSpPr>
-          <p:cNvPr id="31" name="Rectangle 30">
-            <a:extLst>
-              <a:ext uri="{FF2B5EF4-FFF2-40B4-BE49-F238E27FC236}">
-                <a16:creationId xmlns:a16="http://schemas.microsoft.com/office/drawing/2014/main" id="{0872BC5F-BD41-4A94-B46D-E7EFFA0F55D7}"/>
-              </a:ext>
-            </a:extLst>
-          </p:cNvPr>
-          <p:cNvSpPr/>
-          <p:nvPr/>
-        </p:nvSpPr>
-        <p:spPr>
-          <a:xfrm>
-            <a:off x="4594015" y="4410624"/>
-            <a:ext cx="2915919" cy="1857983"/>
-          </a:xfrm>
-          <a:prstGeom prst="rect">
-            <a:avLst/>
-          </a:prstGeom>
-          <a:noFill/>
-          <a:ln w="25400">
-            <a:solidFill>
-              <a:srgbClr val="EA4335"/>
-            </a:solidFill>
-          </a:ln>
-        </p:spPr>
-        <p:style>
-          <a:lnRef idx="2">
-            <a:schemeClr val="accent1">
-              <a:shade val="50000"/>
-            </a:schemeClr>
-          </a:lnRef>
-          <a:fillRef idx="1">
-            <a:schemeClr val="accent1"/>
-          </a:fillRef>
-          <a:effectRef idx="0">
-            <a:schemeClr val="accent1"/>
-          </a:effectRef>
-          <a:fontRef idx="minor">
-            <a:schemeClr val="lt1"/>
-          </a:fontRef>
-        </p:style>
-        <p:txBody>
-          <a:bodyPr rtlCol="0" anchor="ctr"/>
-          <a:lstStyle/>
-          <a:p>
-            <a:pPr marL="285750" indent="-285750">
-              <a:buFont typeface="Arial" panose="020B0604020202020204" pitchFamily="34" charset="0"/>
-              <a:buChar char="•"/>
-            </a:pPr>
-            <a:r>
-              <a:rPr lang="en-SG" dirty="0">
-                <a:solidFill>
-                  <a:schemeClr val="tx1"/>
-                </a:solidFill>
-              </a:rPr>
-              <a:t>Powered by UI Tag</a:t>
-            </a:r>
-          </a:p>
-        </p:txBody>
-      </p:sp>
-      <p:sp>
-        <p:nvSpPr>
-          <p:cNvPr id="32" name="Rectangle 31">
-            <a:extLst>
-              <a:ext uri="{FF2B5EF4-FFF2-40B4-BE49-F238E27FC236}">
-                <a16:creationId xmlns:a16="http://schemas.microsoft.com/office/drawing/2014/main" id="{263A4C2F-3FCE-4954-87E5-2E588684D122}"/>
-              </a:ext>
-            </a:extLst>
-          </p:cNvPr>
-          <p:cNvSpPr/>
-          <p:nvPr/>
-        </p:nvSpPr>
-        <p:spPr>
-          <a:xfrm>
-            <a:off x="8615126" y="4410624"/>
-            <a:ext cx="2915919" cy="1857983"/>
-          </a:xfrm>
-          <a:prstGeom prst="rect">
-            <a:avLst/>
-          </a:prstGeom>
-          <a:noFill/>
-          <a:ln w="25400">
-            <a:solidFill>
-              <a:srgbClr val="FBBC05"/>
-            </a:solidFill>
-          </a:ln>
-        </p:spPr>
-        <p:style>
-          <a:lnRef idx="2">
-            <a:schemeClr val="accent1">
-              <a:shade val="50000"/>
-            </a:schemeClr>
-          </a:lnRef>
-          <a:fillRef idx="1">
-            <a:schemeClr val="accent1"/>
-          </a:fillRef>
-          <a:effectRef idx="0">
-            <a:schemeClr val="accent1"/>
-          </a:effectRef>
-          <a:fontRef idx="minor">
-            <a:schemeClr val="lt1"/>
-          </a:fontRef>
-        </p:style>
-        <p:txBody>
-          <a:bodyPr rtlCol="0" anchor="ctr"/>
-          <a:lstStyle/>
-          <a:p>
-            <a:pPr marL="285750" indent="-285750">
-              <a:buFont typeface="Arial" panose="020B0604020202020204" pitchFamily="34" charset="0"/>
-              <a:buChar char="•"/>
-            </a:pPr>
-            <a:r>
-              <a:rPr lang="en-SG" dirty="0">
-                <a:solidFill>
-                  <a:schemeClr val="tx1"/>
-                </a:solidFill>
-              </a:rPr>
-              <a:t>Powered by Bert </a:t>
-            </a:r>
-          </a:p>
         </p:txBody>
       </p:sp>
       <p:pic>
         <p:nvPicPr>
-          <p:cNvPr id="9" name="Picture 8">
-            <a:extLst>
-              <a:ext uri="{FF2B5EF4-FFF2-40B4-BE49-F238E27FC236}">
-                <a16:creationId xmlns:a16="http://schemas.microsoft.com/office/drawing/2014/main" id="{9E0F87DA-55CB-4B07-85D3-CD32A59E5178}"/>
-              </a:ext>
-            </a:extLst>
-          </p:cNvPr>
-          <p:cNvPicPr>
-            <a:picLocks noChangeAspect="1"/>
-          </p:cNvPicPr>
-          <p:nvPr/>
-        </p:nvPicPr>
-        <p:blipFill>
-          <a:blip r:embed="rId2"/>
-          <a:stretch>
-            <a:fillRect/>
-          </a:stretch>
-        </p:blipFill>
-        <p:spPr>
-          <a:xfrm>
-            <a:off x="640563" y="1548418"/>
-            <a:ext cx="2264130" cy="1333850"/>
-          </a:xfrm>
-          <a:prstGeom prst="rect">
-            <a:avLst/>
-          </a:prstGeom>
-        </p:spPr>
-      </p:pic>
-      <p:pic>
-        <p:nvPicPr>
-          <p:cNvPr id="36" name="Picture 2" descr="Google Assistant - Wikipedia">
-            <a:extLst>
-              <a:ext uri="{FF2B5EF4-FFF2-40B4-BE49-F238E27FC236}">
-                <a16:creationId xmlns:a16="http://schemas.microsoft.com/office/drawing/2014/main" id="{2BA0ECC8-1A81-48E9-807F-381E5C63762F}"/>
+          <p:cNvPr id="3" name="Picture 2" descr="5 Key Takeaways About Google's BERT Update | by Amarpreet Singh |  Brandlitic | Medium">
+            <a:extLst>
+              <a:ext uri="{FF2B5EF4-FFF2-40B4-BE49-F238E27FC236}">
+                <a16:creationId xmlns:a16="http://schemas.microsoft.com/office/drawing/2014/main" id="{7C60A221-318A-416A-8F2E-1BF59C628E73}"/>
               </a:ext>
             </a:extLst>
           </p:cNvPr>
@@ -9563,7 +9941,7 @@
           <p:nvPr/>
         </p:nvPicPr>
         <p:blipFill>
-          <a:blip r:embed="rId3">
+          <a:blip r:embed="rId12">
             <a:extLst>
               <a:ext uri="{28A0092B-C50C-407E-A947-70E740481C1C}">
                 <a14:useLocalDpi xmlns:a14="http://schemas.microsoft.com/office/drawing/2010/main" val="0"/>
@@ -9577,8 +9955,8 @@
         </p:blipFill>
         <p:spPr bwMode="auto">
           <a:xfrm>
-            <a:off x="2069721" y="777786"/>
-            <a:ext cx="1703428" cy="1705067"/>
+            <a:off x="9298950" y="5131022"/>
+            <a:ext cx="2168952" cy="959655"/>
           </a:xfrm>
           <a:prstGeom prst="rect">
             <a:avLst/>
@@ -9595,241 +9973,10 @@
           </a:extLst>
         </p:spPr>
       </p:pic>
-      <p:pic>
-        <p:nvPicPr>
-          <p:cNvPr id="1026" name="Picture 2" descr="Amazon to expand to South East Asia through Singapore - KLGadgetGuy">
-            <a:extLst>
-              <a:ext uri="{FF2B5EF4-FFF2-40B4-BE49-F238E27FC236}">
-                <a16:creationId xmlns:a16="http://schemas.microsoft.com/office/drawing/2014/main" id="{10D99925-2D82-42A7-BC92-60BD91ABD7F2}"/>
-              </a:ext>
-            </a:extLst>
-          </p:cNvPr>
-          <p:cNvPicPr>
-            <a:picLocks noChangeAspect="1" noChangeArrowheads="1"/>
-          </p:cNvPicPr>
-          <p:nvPr/>
-        </p:nvPicPr>
-        <p:blipFill rotWithShape="1">
-          <a:blip r:embed="rId4">
-            <a:extLst>
-              <a:ext uri="{28A0092B-C50C-407E-A947-70E740481C1C}">
-                <a14:useLocalDpi xmlns:a14="http://schemas.microsoft.com/office/drawing/2010/main" val="0"/>
-              </a:ext>
-            </a:extLst>
-          </a:blip>
-          <a:srcRect l="7264" t="29085" r="7174" b="34689"/>
-          <a:stretch/>
-        </p:blipFill>
-        <p:spPr bwMode="auto">
-          <a:xfrm>
-            <a:off x="6225471" y="1397231"/>
-            <a:ext cx="1730449" cy="732652"/>
-          </a:xfrm>
-          <a:prstGeom prst="rect">
-            <a:avLst/>
-          </a:prstGeom>
-          <a:noFill/>
-          <a:extLst>
-            <a:ext uri="{909E8E84-426E-40DD-AFC4-6F175D3DCCD1}">
-              <a14:hiddenFill xmlns:a14="http://schemas.microsoft.com/office/drawing/2010/main">
-                <a:solidFill>
-                  <a:srgbClr val="FFFFFF"/>
-                </a:solidFill>
-              </a14:hiddenFill>
-            </a:ext>
-          </a:extLst>
-        </p:spPr>
-      </p:pic>
-      <p:pic>
-        <p:nvPicPr>
-          <p:cNvPr id="1028" name="Picture 4" descr="Global Civica Office Locations Civica - induced.info">
-            <a:extLst>
-              <a:ext uri="{FF2B5EF4-FFF2-40B4-BE49-F238E27FC236}">
-                <a16:creationId xmlns:a16="http://schemas.microsoft.com/office/drawing/2014/main" id="{406ABC36-8590-4A24-AB54-21773F5013C8}"/>
-              </a:ext>
-            </a:extLst>
-          </p:cNvPr>
-          <p:cNvPicPr>
-            <a:picLocks noChangeAspect="1" noChangeArrowheads="1"/>
-          </p:cNvPicPr>
-          <p:nvPr/>
-        </p:nvPicPr>
-        <p:blipFill rotWithShape="1">
-          <a:blip r:embed="rId5">
-            <a:extLst>
-              <a:ext uri="{28A0092B-C50C-407E-A947-70E740481C1C}">
-                <a14:useLocalDpi xmlns:a14="http://schemas.microsoft.com/office/drawing/2010/main" val="0"/>
-              </a:ext>
-            </a:extLst>
-          </a:blip>
-          <a:srcRect l="12647" t="19936"/>
-          <a:stretch/>
-        </p:blipFill>
-        <p:spPr bwMode="auto">
-          <a:xfrm>
-            <a:off x="4463092" y="1121982"/>
-            <a:ext cx="1762379" cy="1371221"/>
-          </a:xfrm>
-          <a:prstGeom prst="rect">
-            <a:avLst/>
-          </a:prstGeom>
-          <a:noFill/>
-          <a:extLst>
-            <a:ext uri="{909E8E84-426E-40DD-AFC4-6F175D3DCCD1}">
-              <a14:hiddenFill xmlns:a14="http://schemas.microsoft.com/office/drawing/2010/main">
-                <a:solidFill>
-                  <a:srgbClr val="FFFFFF"/>
-                </a:solidFill>
-              </a14:hiddenFill>
-            </a:ext>
-          </a:extLst>
-        </p:spPr>
-      </p:pic>
-      <p:pic>
-        <p:nvPicPr>
-          <p:cNvPr id="1030" name="Picture 6" descr="Building a More Intelligent Enterprise">
-            <a:extLst>
-              <a:ext uri="{FF2B5EF4-FFF2-40B4-BE49-F238E27FC236}">
-                <a16:creationId xmlns:a16="http://schemas.microsoft.com/office/drawing/2014/main" id="{8B61D762-D553-41C8-BDFB-2008277CCCEA}"/>
-              </a:ext>
-            </a:extLst>
-          </p:cNvPr>
-          <p:cNvPicPr>
-            <a:picLocks noChangeAspect="1" noChangeArrowheads="1"/>
-          </p:cNvPicPr>
-          <p:nvPr/>
-        </p:nvPicPr>
-        <p:blipFill>
-          <a:blip r:embed="rId6">
-            <a:extLst>
-              <a:ext uri="{28A0092B-C50C-407E-A947-70E740481C1C}">
-                <a14:useLocalDpi xmlns:a14="http://schemas.microsoft.com/office/drawing/2010/main" val="0"/>
-              </a:ext>
-            </a:extLst>
-          </a:blip>
-          <a:srcRect/>
-          <a:stretch>
-            <a:fillRect/>
-          </a:stretch>
-        </p:blipFill>
-        <p:spPr bwMode="auto">
-          <a:xfrm>
-            <a:off x="9076850" y="767323"/>
-            <a:ext cx="1992469" cy="1992469"/>
-          </a:xfrm>
-          <a:prstGeom prst="rect">
-            <a:avLst/>
-          </a:prstGeom>
-          <a:noFill/>
-          <a:extLst>
-            <a:ext uri="{909E8E84-426E-40DD-AFC4-6F175D3DCCD1}">
-              <a14:hiddenFill xmlns:a14="http://schemas.microsoft.com/office/drawing/2010/main">
-                <a:solidFill>
-                  <a:srgbClr val="FFFFFF"/>
-                </a:solidFill>
-              </a14:hiddenFill>
-            </a:ext>
-          </a:extLst>
-        </p:spPr>
-      </p:pic>
-      <p:pic>
-        <p:nvPicPr>
-          <p:cNvPr id="2" name="Picture 2">
-            <a:extLst>
-              <a:ext uri="{FF2B5EF4-FFF2-40B4-BE49-F238E27FC236}">
-                <a16:creationId xmlns:a16="http://schemas.microsoft.com/office/drawing/2014/main" id="{E9ACEE18-34A1-433F-BCE3-148909EDB217}"/>
-              </a:ext>
-            </a:extLst>
-          </p:cNvPr>
-          <p:cNvPicPr>
-            <a:picLocks noChangeAspect="1" noChangeArrowheads="1"/>
-          </p:cNvPicPr>
-          <p:nvPr/>
-        </p:nvPicPr>
-        <p:blipFill>
-          <a:blip r:embed="rId7">
-            <a:extLst>
-              <a:ext uri="{28A0092B-C50C-407E-A947-70E740481C1C}">
-                <a14:useLocalDpi xmlns:a14="http://schemas.microsoft.com/office/drawing/2010/main" val="0"/>
-              </a:ext>
-            </a:extLst>
-          </a:blip>
-          <a:srcRect/>
-          <a:stretch>
-            <a:fillRect/>
-          </a:stretch>
-        </p:blipFill>
-        <p:spPr bwMode="auto">
-          <a:xfrm>
-            <a:off x="1950268" y="2557479"/>
-            <a:ext cx="1998895" cy="529395"/>
-          </a:xfrm>
-          <a:prstGeom prst="rect">
-            <a:avLst/>
-          </a:prstGeom>
-          <a:solidFill>
-            <a:schemeClr val="bg1"/>
-          </a:solidFill>
-        </p:spPr>
-      </p:pic>
-      <p:pic>
-        <p:nvPicPr>
-          <p:cNvPr id="17" name="Picture 6" descr="Release 6.14.0">
-            <a:extLst>
-              <a:ext uri="{FF2B5EF4-FFF2-40B4-BE49-F238E27FC236}">
-                <a16:creationId xmlns:a16="http://schemas.microsoft.com/office/drawing/2014/main" id="{B9708D2D-7439-4C37-9549-9E86CF20F61F}"/>
-              </a:ext>
-            </a:extLst>
-          </p:cNvPr>
-          <p:cNvPicPr>
-            <a:picLocks noChangeAspect="1" noChangeArrowheads="1"/>
-          </p:cNvPicPr>
-          <p:nvPr/>
-        </p:nvPicPr>
-        <p:blipFill>
-          <a:blip r:embed="rId8">
-            <a:extLst>
-              <a:ext uri="{28A0092B-C50C-407E-A947-70E740481C1C}">
-                <a14:useLocalDpi xmlns:a14="http://schemas.microsoft.com/office/drawing/2010/main" val="0"/>
-              </a:ext>
-            </a:extLst>
-          </a:blip>
-          <a:srcRect/>
-          <a:stretch>
-            <a:fillRect/>
-          </a:stretch>
-        </p:blipFill>
-        <p:spPr bwMode="auto">
-          <a:xfrm>
-            <a:off x="5349447" y="2369735"/>
-            <a:ext cx="1628678" cy="597036"/>
-          </a:xfrm>
-          <a:prstGeom prst="rect">
-            <a:avLst/>
-          </a:prstGeom>
-          <a:noFill/>
-          <a:effectLst>
-            <a:outerShdw blurRad="50800" dist="38100" dir="2700000" algn="tl" rotWithShape="0">
-              <a:prstClr val="black">
-                <a:alpha val="40000"/>
-              </a:prstClr>
-            </a:outerShdw>
-          </a:effectLst>
-          <a:extLst>
-            <a:ext uri="{909E8E84-426E-40DD-AFC4-6F175D3DCCD1}">
-              <a14:hiddenFill xmlns:a14="http://schemas.microsoft.com/office/drawing/2010/main">
-                <a:solidFill>
-                  <a:srgbClr val="FFFFFF"/>
-                </a:solidFill>
-              </a14:hiddenFill>
-            </a:ext>
-          </a:extLst>
-        </p:spPr>
-      </p:pic>
     </p:spTree>
     <p:extLst>
       <p:ext uri="{BB962C8B-B14F-4D97-AF65-F5344CB8AC3E}">
-        <p14:creationId xmlns:p14="http://schemas.microsoft.com/office/powerpoint/2010/main" val="2019296104"/>
+        <p14:creationId xmlns:p14="http://schemas.microsoft.com/office/powerpoint/2010/main" val="2957680443"/>
       </p:ext>
     </p:extLst>
   </p:cSld>

</xml_diff>